<commit_message>
Revised Descriptions & Headings
</commit_message>
<xml_diff>
--- a/Omnimagnet Mind Map 06.25.2016 (wo parameter description).pptx
+++ b/Omnimagnet Mind Map 06.25.2016 (wo parameter description).pptx
@@ -21,19 +21,17 @@
     <p:sldId id="275" r:id="rId15"/>
     <p:sldId id="293" r:id="rId16"/>
     <p:sldId id="288" r:id="rId17"/>
-    <p:sldId id="276" r:id="rId18"/>
-    <p:sldId id="287" r:id="rId19"/>
-    <p:sldId id="277" r:id="rId20"/>
-    <p:sldId id="289" r:id="rId21"/>
-    <p:sldId id="290" r:id="rId22"/>
-    <p:sldId id="282" r:id="rId23"/>
-    <p:sldId id="291" r:id="rId24"/>
-    <p:sldId id="278" r:id="rId25"/>
-    <p:sldId id="262" r:id="rId26"/>
-    <p:sldId id="280" r:id="rId27"/>
-    <p:sldId id="281" r:id="rId28"/>
-    <p:sldId id="292" r:id="rId29"/>
-    <p:sldId id="263" r:id="rId30"/>
+    <p:sldId id="277" r:id="rId18"/>
+    <p:sldId id="289" r:id="rId19"/>
+    <p:sldId id="290" r:id="rId20"/>
+    <p:sldId id="282" r:id="rId21"/>
+    <p:sldId id="291" r:id="rId22"/>
+    <p:sldId id="278" r:id="rId23"/>
+    <p:sldId id="262" r:id="rId24"/>
+    <p:sldId id="280" r:id="rId25"/>
+    <p:sldId id="281" r:id="rId26"/>
+    <p:sldId id="292" r:id="rId27"/>
+    <p:sldId id="263" r:id="rId28"/>
   </p:sldIdLst>
   <p:sldSz cx="12192000" cy="6858000"/>
   <p:notesSz cx="6858000" cy="9144000"/>
@@ -1445,30 +1443,30 @@
     </dgm:pt>
   </dgm:ptLst>
   <dgm:cxnLst>
-    <dgm:cxn modelId="{2C2DBED4-8D21-45CF-8078-9E77B3B0E9BE}" type="presOf" srcId="{9618B912-7BF9-482D-9A35-A19F1BA6E5D7}" destId="{21A582F4-AA4C-4B1F-AF7F-52131ABC6B98}" srcOrd="1" destOrd="0" presId="urn:microsoft.com/office/officeart/2008/layout/HalfCircleOrganizationChart"/>
-    <dgm:cxn modelId="{09E3051E-A403-4488-9A25-3F66E4CD886A}" srcId="{0C94F225-BF75-4054-8356-81FF6BD549DB}" destId="{9618B912-7BF9-482D-9A35-A19F1BA6E5D7}" srcOrd="0" destOrd="0" parTransId="{3E3C527F-4C71-47AE-BE2E-8BDD0856A2C3}" sibTransId="{5F19DEAC-066D-4708-AFFE-CB7B6198535C}"/>
-    <dgm:cxn modelId="{3B57B630-4876-4911-9DF3-291C3AB29D0E}" type="presOf" srcId="{A7D202F0-D63A-4C57-B538-CC0D62AE5DD7}" destId="{F031A1ED-9F0D-411E-AEB3-793EFFC78A50}" srcOrd="1" destOrd="0" presId="urn:microsoft.com/office/officeart/2008/layout/HalfCircleOrganizationChart"/>
     <dgm:cxn modelId="{641ABD72-D651-45FF-8EB7-93A453DB30FE}" type="presOf" srcId="{E43C47DE-0242-4F8C-9D3E-BD4BFD82D4B4}" destId="{41699C82-7078-4E86-931C-4FC7E06F3394}" srcOrd="0" destOrd="0" presId="urn:microsoft.com/office/officeart/2008/layout/HalfCircleOrganizationChart"/>
-    <dgm:cxn modelId="{55967C5D-E66C-4C8E-BF0A-87053F0042B5}" type="presOf" srcId="{930EF7F3-A66F-4DE8-BEAC-5C2ECBCA5494}" destId="{EB89B207-3558-4852-841C-4DA97203D8CB}" srcOrd="0" destOrd="0" presId="urn:microsoft.com/office/officeart/2008/layout/HalfCircleOrganizationChart"/>
     <dgm:cxn modelId="{9E8734DB-F061-4597-A979-00FFCFAB7D25}" srcId="{E43C47DE-0242-4F8C-9D3E-BD4BFD82D4B4}" destId="{A7D202F0-D63A-4C57-B538-CC0D62AE5DD7}" srcOrd="0" destOrd="0" parTransId="{88A887F2-E15F-4D34-B426-7BE066A9F3A0}" sibTransId="{B1BBBD72-1CB3-49E7-A088-547C50F17B8B}"/>
-    <dgm:cxn modelId="{128234F3-EB1D-4D36-9990-81625688843C}" type="presOf" srcId="{3E3C527F-4C71-47AE-BE2E-8BDD0856A2C3}" destId="{75EFA31A-1010-486F-B2A1-1D9604509D21}" srcOrd="0" destOrd="0" presId="urn:microsoft.com/office/officeart/2008/layout/HalfCircleOrganizationChart"/>
-    <dgm:cxn modelId="{24BA145F-A9D2-4E4F-9AE9-41E93CADD0DF}" type="presOf" srcId="{0C94F225-BF75-4054-8356-81FF6BD549DB}" destId="{41F5A443-D643-41B5-A383-F71BDF4E8FD9}" srcOrd="1" destOrd="0" presId="urn:microsoft.com/office/officeart/2008/layout/HalfCircleOrganizationChart"/>
     <dgm:cxn modelId="{88A5027D-260D-42E4-8296-B2EB5969B47A}" type="presOf" srcId="{88A887F2-E15F-4D34-B426-7BE066A9F3A0}" destId="{81577255-F99C-4227-A221-584CB22BC6B6}" srcOrd="0" destOrd="0" presId="urn:microsoft.com/office/officeart/2008/layout/HalfCircleOrganizationChart"/>
-    <dgm:cxn modelId="{84D46CAC-CBB1-4F0A-9C0B-7EE53E1426DD}" type="presOf" srcId="{D7DAEA5D-8F70-4339-A975-5E494E7C8BB0}" destId="{0E9F9121-0994-451D-AE87-6C5BBFF9E57D}" srcOrd="0" destOrd="0" presId="urn:microsoft.com/office/officeart/2008/layout/HalfCircleOrganizationChart"/>
+    <dgm:cxn modelId="{7E6EAFEF-974C-45B1-A5A0-4D4A8C3F66B6}" type="presOf" srcId="{A7D202F0-D63A-4C57-B538-CC0D62AE5DD7}" destId="{515053C0-E986-4714-B02A-3E305F589713}" srcOrd="0" destOrd="0" presId="urn:microsoft.com/office/officeart/2008/layout/HalfCircleOrganizationChart"/>
+    <dgm:cxn modelId="{92C704CA-9D27-485F-AAD3-053C7B06B48A}" type="presOf" srcId="{578A809E-0C12-4ED7-8AA6-57E747CC7EC0}" destId="{BFB6D176-B34E-4888-81DF-DCC784B69EE7}" srcOrd="0" destOrd="0" presId="urn:microsoft.com/office/officeart/2008/layout/HalfCircleOrganizationChart"/>
+    <dgm:cxn modelId="{79EBEA96-D779-4A56-8212-CF1F8BFF4F6D}" type="presOf" srcId="{9618B912-7BF9-482D-9A35-A19F1BA6E5D7}" destId="{59689A54-1E5E-4CFB-A766-42BF863F9643}" srcOrd="0" destOrd="0" presId="urn:microsoft.com/office/officeart/2008/layout/HalfCircleOrganizationChart"/>
     <dgm:cxn modelId="{2F16E3E1-1403-403E-98E8-3DD86EC83BC0}" type="presOf" srcId="{578A809E-0C12-4ED7-8AA6-57E747CC7EC0}" destId="{D81C7C6C-AD28-4BCE-BBD5-CF8BE7B7F38D}" srcOrd="1" destOrd="0" presId="urn:microsoft.com/office/officeart/2008/layout/HalfCircleOrganizationChart"/>
-    <dgm:cxn modelId="{3CF3CE1E-06F1-4E0C-8301-D4444CFDEAA9}" type="presOf" srcId="{CF59F1E7-E7A0-4416-B0F9-A5F454FE1946}" destId="{FEAA704B-8654-43BC-8FB1-3815C41A7A88}" srcOrd="0" destOrd="0" presId="urn:microsoft.com/office/officeart/2008/layout/HalfCircleOrganizationChart"/>
-    <dgm:cxn modelId="{79EBEA96-D779-4A56-8212-CF1F8BFF4F6D}" type="presOf" srcId="{9618B912-7BF9-482D-9A35-A19F1BA6E5D7}" destId="{59689A54-1E5E-4CFB-A766-42BF863F9643}" srcOrd="0" destOrd="0" presId="urn:microsoft.com/office/officeart/2008/layout/HalfCircleOrganizationChart"/>
     <dgm:cxn modelId="{3EC6FBD5-6A93-42C9-A6D4-970ED4EF34B0}" type="presOf" srcId="{AFF83178-69EC-4D1D-A209-E7613F23300A}" destId="{54DB88CD-BDE0-4CDB-882E-99AD09629336}" srcOrd="0" destOrd="0" presId="urn:microsoft.com/office/officeart/2008/layout/HalfCircleOrganizationChart"/>
     <dgm:cxn modelId="{01AF8C5A-C808-4CD7-B1F6-0A509E242121}" srcId="{A7D202F0-D63A-4C57-B538-CC0D62AE5DD7}" destId="{578A809E-0C12-4ED7-8AA6-57E747CC7EC0}" srcOrd="1" destOrd="0" parTransId="{930EF7F3-A66F-4DE8-BEAC-5C2ECBCA5494}" sibTransId="{CFDA19A4-3292-4F70-832E-EDA5B66F6292}"/>
-    <dgm:cxn modelId="{92C704CA-9D27-485F-AAD3-053C7B06B48A}" type="presOf" srcId="{578A809E-0C12-4ED7-8AA6-57E747CC7EC0}" destId="{BFB6D176-B34E-4888-81DF-DCC784B69EE7}" srcOrd="0" destOrd="0" presId="urn:microsoft.com/office/officeart/2008/layout/HalfCircleOrganizationChart"/>
+    <dgm:cxn modelId="{128234F3-EB1D-4D36-9990-81625688843C}" type="presOf" srcId="{3E3C527F-4C71-47AE-BE2E-8BDD0856A2C3}" destId="{75EFA31A-1010-486F-B2A1-1D9604509D21}" srcOrd="0" destOrd="0" presId="urn:microsoft.com/office/officeart/2008/layout/HalfCircleOrganizationChart"/>
+    <dgm:cxn modelId="{09E3051E-A403-4488-9A25-3F66E4CD886A}" srcId="{0C94F225-BF75-4054-8356-81FF6BD549DB}" destId="{9618B912-7BF9-482D-9A35-A19F1BA6E5D7}" srcOrd="0" destOrd="0" parTransId="{3E3C527F-4C71-47AE-BE2E-8BDD0856A2C3}" sibTransId="{5F19DEAC-066D-4708-AFFE-CB7B6198535C}"/>
+    <dgm:cxn modelId="{2A7B8FDF-B4A2-406A-A1BB-755FFD4905BA}" type="presOf" srcId="{0C94F225-BF75-4054-8356-81FF6BD549DB}" destId="{3685253A-CB40-4640-89AD-C7A1DDD13FE7}" srcOrd="0" destOrd="0" presId="urn:microsoft.com/office/officeart/2008/layout/HalfCircleOrganizationChart"/>
+    <dgm:cxn modelId="{84D46CAC-CBB1-4F0A-9C0B-7EE53E1426DD}" type="presOf" srcId="{D7DAEA5D-8F70-4339-A975-5E494E7C8BB0}" destId="{0E9F9121-0994-451D-AE87-6C5BBFF9E57D}" srcOrd="0" destOrd="0" presId="urn:microsoft.com/office/officeart/2008/layout/HalfCircleOrganizationChart"/>
+    <dgm:cxn modelId="{36646C0C-DC27-4318-ADDF-73D66681D457}" srcId="{A7D202F0-D63A-4C57-B538-CC0D62AE5DD7}" destId="{AFF83178-69EC-4D1D-A209-E7613F23300A}" srcOrd="0" destOrd="0" parTransId="{91AB05C9-2933-4105-99C2-A34B78BAE4B5}" sibTransId="{81BCDA87-3ACA-4E93-9684-558A401EA1A9}"/>
+    <dgm:cxn modelId="{55967C5D-E66C-4C8E-BF0A-87053F0042B5}" type="presOf" srcId="{930EF7F3-A66F-4DE8-BEAC-5C2ECBCA5494}" destId="{EB89B207-3558-4852-841C-4DA97203D8CB}" srcOrd="0" destOrd="0" presId="urn:microsoft.com/office/officeart/2008/layout/HalfCircleOrganizationChart"/>
+    <dgm:cxn modelId="{3B57B630-4876-4911-9DF3-291C3AB29D0E}" type="presOf" srcId="{A7D202F0-D63A-4C57-B538-CC0D62AE5DD7}" destId="{F031A1ED-9F0D-411E-AEB3-793EFFC78A50}" srcOrd="1" destOrd="0" presId="urn:microsoft.com/office/officeart/2008/layout/HalfCircleOrganizationChart"/>
+    <dgm:cxn modelId="{9ACB94FD-16A4-42A1-ABF7-2E12EC842921}" type="presOf" srcId="{AFF83178-69EC-4D1D-A209-E7613F23300A}" destId="{2E9C9994-A74E-4337-862F-74D54B3D3371}" srcOrd="1" destOrd="0" presId="urn:microsoft.com/office/officeart/2008/layout/HalfCircleOrganizationChart"/>
+    <dgm:cxn modelId="{2C2DBED4-8D21-45CF-8078-9E77B3B0E9BE}" type="presOf" srcId="{9618B912-7BF9-482D-9A35-A19F1BA6E5D7}" destId="{21A582F4-AA4C-4B1F-AF7F-52131ABC6B98}" srcOrd="1" destOrd="0" presId="urn:microsoft.com/office/officeart/2008/layout/HalfCircleOrganizationChart"/>
+    <dgm:cxn modelId="{5B375652-101B-4C82-9BAC-6334E2878165}" srcId="{9618B912-7BF9-482D-9A35-A19F1BA6E5D7}" destId="{E43C47DE-0242-4F8C-9D3E-BD4BFD82D4B4}" srcOrd="0" destOrd="0" parTransId="{D7DAEA5D-8F70-4339-A975-5E494E7C8BB0}" sibTransId="{D1979AF8-ACFF-436B-A601-327799AAE45F}"/>
+    <dgm:cxn modelId="{49C55394-08E7-4A53-B984-465B48832DFC}" type="presOf" srcId="{91AB05C9-2933-4105-99C2-A34B78BAE4B5}" destId="{1ACED533-1F64-41A5-888B-280630C5A628}" srcOrd="0" destOrd="0" presId="urn:microsoft.com/office/officeart/2008/layout/HalfCircleOrganizationChart"/>
     <dgm:cxn modelId="{31161A4D-B62C-4E90-AE8E-1FF12F4C5B6A}" type="presOf" srcId="{E43C47DE-0242-4F8C-9D3E-BD4BFD82D4B4}" destId="{C735C57C-6B46-4FF2-A3A6-54AA258B0AF5}" srcOrd="1" destOrd="0" presId="urn:microsoft.com/office/officeart/2008/layout/HalfCircleOrganizationChart"/>
-    <dgm:cxn modelId="{9ACB94FD-16A4-42A1-ABF7-2E12EC842921}" type="presOf" srcId="{AFF83178-69EC-4D1D-A209-E7613F23300A}" destId="{2E9C9994-A74E-4337-862F-74D54B3D3371}" srcOrd="1" destOrd="0" presId="urn:microsoft.com/office/officeart/2008/layout/HalfCircleOrganizationChart"/>
-    <dgm:cxn modelId="{49C55394-08E7-4A53-B984-465B48832DFC}" type="presOf" srcId="{91AB05C9-2933-4105-99C2-A34B78BAE4B5}" destId="{1ACED533-1F64-41A5-888B-280630C5A628}" srcOrd="0" destOrd="0" presId="urn:microsoft.com/office/officeart/2008/layout/HalfCircleOrganizationChart"/>
-    <dgm:cxn modelId="{7E6EAFEF-974C-45B1-A5A0-4D4A8C3F66B6}" type="presOf" srcId="{A7D202F0-D63A-4C57-B538-CC0D62AE5DD7}" destId="{515053C0-E986-4714-B02A-3E305F589713}" srcOrd="0" destOrd="0" presId="urn:microsoft.com/office/officeart/2008/layout/HalfCircleOrganizationChart"/>
-    <dgm:cxn modelId="{36646C0C-DC27-4318-ADDF-73D66681D457}" srcId="{A7D202F0-D63A-4C57-B538-CC0D62AE5DD7}" destId="{AFF83178-69EC-4D1D-A209-E7613F23300A}" srcOrd="0" destOrd="0" parTransId="{91AB05C9-2933-4105-99C2-A34B78BAE4B5}" sibTransId="{81BCDA87-3ACA-4E93-9684-558A401EA1A9}"/>
+    <dgm:cxn modelId="{3CF3CE1E-06F1-4E0C-8301-D4444CFDEAA9}" type="presOf" srcId="{CF59F1E7-E7A0-4416-B0F9-A5F454FE1946}" destId="{FEAA704B-8654-43BC-8FB1-3815C41A7A88}" srcOrd="0" destOrd="0" presId="urn:microsoft.com/office/officeart/2008/layout/HalfCircleOrganizationChart"/>
     <dgm:cxn modelId="{66E91964-343B-4624-A98C-B79828B95601}" srcId="{CF59F1E7-E7A0-4416-B0F9-A5F454FE1946}" destId="{0C94F225-BF75-4054-8356-81FF6BD549DB}" srcOrd="0" destOrd="0" parTransId="{5288F7D6-A457-4933-8232-2DECCD5E11FA}" sibTransId="{75611134-3AF8-4680-980D-314BD6D98671}"/>
-    <dgm:cxn modelId="{5B375652-101B-4C82-9BAC-6334E2878165}" srcId="{9618B912-7BF9-482D-9A35-A19F1BA6E5D7}" destId="{E43C47DE-0242-4F8C-9D3E-BD4BFD82D4B4}" srcOrd="0" destOrd="0" parTransId="{D7DAEA5D-8F70-4339-A975-5E494E7C8BB0}" sibTransId="{D1979AF8-ACFF-436B-A601-327799AAE45F}"/>
-    <dgm:cxn modelId="{2A7B8FDF-B4A2-406A-A1BB-755FFD4905BA}" type="presOf" srcId="{0C94F225-BF75-4054-8356-81FF6BD549DB}" destId="{3685253A-CB40-4640-89AD-C7A1DDD13FE7}" srcOrd="0" destOrd="0" presId="urn:microsoft.com/office/officeart/2008/layout/HalfCircleOrganizationChart"/>
+    <dgm:cxn modelId="{24BA145F-A9D2-4E4F-9AE9-41E93CADD0DF}" type="presOf" srcId="{0C94F225-BF75-4054-8356-81FF6BD549DB}" destId="{41F5A443-D643-41B5-A383-F71BDF4E8FD9}" srcOrd="1" destOrd="0" presId="urn:microsoft.com/office/officeart/2008/layout/HalfCircleOrganizationChart"/>
     <dgm:cxn modelId="{35CE32A5-28C3-4A8B-8F05-25B59F344F38}" type="presParOf" srcId="{FEAA704B-8654-43BC-8FB1-3815C41A7A88}" destId="{4B28BA13-9CF7-4CE2-A0F8-00C420C9F186}" srcOrd="0" destOrd="0" presId="urn:microsoft.com/office/officeart/2008/layout/HalfCircleOrganizationChart"/>
     <dgm:cxn modelId="{73B1A210-9943-4F9F-8A09-8025DA10D99B}" type="presParOf" srcId="{4B28BA13-9CF7-4CE2-A0F8-00C420C9F186}" destId="{1623F42F-E9B6-4757-A575-8FB05642B7CC}" srcOrd="0" destOrd="0" presId="urn:microsoft.com/office/officeart/2008/layout/HalfCircleOrganizationChart"/>
     <dgm:cxn modelId="{E318C872-A65C-40FA-9AC4-EBEB62324F32}" type="presParOf" srcId="{1623F42F-E9B6-4757-A575-8FB05642B7CC}" destId="{3685253A-CB40-4640-89AD-C7A1DDD13FE7}" srcOrd="0" destOrd="0" presId="urn:microsoft.com/office/officeart/2008/layout/HalfCircleOrganizationChart"/>
@@ -8104,10 +8102,15 @@
             <p:ph idx="1"/>
           </p:nvPr>
         </p:nvSpPr>
-        <p:spPr/>
+        <p:spPr>
+          <a:xfrm>
+            <a:off x="838200" y="1825625"/>
+            <a:ext cx="10515600" cy="4351338"/>
+          </a:xfrm>
+        </p:spPr>
         <p:txBody>
           <a:bodyPr>
-            <a:normAutofit fontScale="70000" lnSpcReduction="20000"/>
+            <a:normAutofit fontScale="92500" lnSpcReduction="20000"/>
           </a:bodyPr>
           <a:lstStyle/>
           <a:p>
@@ -8126,7 +8129,7 @@
           <a:p>
             <a:r>
               <a:rPr lang="en-US" dirty="0"/>
-              <a:t>Rotates magnetic Field around single axis</a:t>
+              <a:t>Doesn’t work with magnetic field currently </a:t>
             </a:r>
           </a:p>
           <a:p>
@@ -8134,15 +8137,6 @@
               <a:buNone/>
             </a:pPr>
             <a:r>
-              <a:rPr lang="en-US" dirty="0"/>
-              <a:t>Rotating Tool</a:t>
-            </a:r>
-          </a:p>
-          <a:p>
-            <a:pPr marL="0" indent="0">
-              <a:buNone/>
-            </a:pPr>
-            <a:r>
               <a:rPr lang="en-US" b="1" dirty="0"/>
               <a:t>Method</a:t>
             </a:r>
@@ -8154,7 +8148,7 @@
           <a:p>
             <a:r>
               <a:rPr lang="en-US" dirty="0"/>
-              <a:t>Two consecutive orientations are found using two consecutive current vectors</a:t>
+              <a:t>Two consecutive orientations are found using two consecutive north pole vectors </a:t>
             </a:r>
           </a:p>
           <a:p>
@@ -8182,33 +8176,23 @@
           <a:p>
             <a:r>
               <a:rPr lang="en-US" dirty="0"/>
-              <a:t>The difference in psi and phi are then converted to a rotation matrix</a:t>
-            </a:r>
-          </a:p>
-          <a:p>
+              <a:t>Dr. Becker’s “</a:t>
+            </a:r>
+            <a:r>
+              <a:rPr lang="en-US" dirty="0" err="1"/>
+              <a:t>RollAnyPointOnTheSphereToAnyDesiredLattitudeLongitudeCoordina</a:t>
+            </a:r>
             <a:r>
               <a:rPr lang="en-US" dirty="0"/>
-              <a:t>This rotation matrix is decomposed into an axis and angle rotation </a:t>
-            </a:r>
-          </a:p>
-          <a:p>
+              <a:t> is used to find the rotation matrix, direction, and translation (</a:t>
+            </a:r>
+            <a:r>
+              <a:rPr lang="en-US" b="1" dirty="0"/>
+              <a:t>point2pointroll</a:t>
+            </a:r>
             <a:r>
               <a:rPr lang="en-US" dirty="0"/>
-              <a:t>The magnetic field is then rotated about this axis</a:t>
-            </a:r>
-          </a:p>
-          <a:p>
-            <a:r>
-              <a:rPr lang="en-US" dirty="0"/>
-              <a:t>The linear velocity consists of the rotation vector in the </a:t>
-            </a:r>
-            <a:r>
-              <a:rPr lang="en-US" dirty="0" err="1"/>
-              <a:t>xy</a:t>
-            </a:r>
-            <a:r>
-              <a:rPr lang="en-US" dirty="0"/>
-              <a:t>-plane</a:t>
+              <a:t>)</a:t>
             </a:r>
           </a:p>
           <a:p>
@@ -8343,8 +8327,12 @@
           <a:p>
             <a:pPr algn="ctr"/>
             <a:r>
+              <a:rPr lang="en-US" dirty="0" err="1"/>
+              <a:t>fwdMagneticField</a:t>
+            </a:r>
+            <a:r>
               <a:rPr lang="en-US" dirty="0"/>
-              <a:t>fwdMagneticField</a:t>
+              <a:t>(Unused)</a:t>
             </a:r>
           </a:p>
         </p:txBody>
@@ -8567,8 +8555,12 @@
           <a:p>
             <a:pPr algn="ctr"/>
             <a:r>
+              <a:rPr lang="en-US" dirty="0" err="1"/>
+              <a:t>inverseMagneticField</a:t>
+            </a:r>
+            <a:r>
               <a:rPr lang="en-US" dirty="0"/>
-              <a:t>inverseMagneticField</a:t>
+              <a:t>(Unused)</a:t>
             </a:r>
           </a:p>
         </p:txBody>
@@ -9546,329 +9538,6 @@
 </file>
 
 <file path=ppt/slides/slide17.xml><?xml version="1.0" encoding="utf-8"?>
-<p:sld xmlns:a="http://schemas.openxmlformats.org/drawingml/2006/main" xmlns:r="http://schemas.openxmlformats.org/officeDocument/2006/relationships" xmlns:p="http://schemas.openxmlformats.org/presentationml/2006/main">
-  <p:cSld>
-    <p:spTree>
-      <p:nvGrpSpPr>
-        <p:cNvPr id="1" name=""/>
-        <p:cNvGrpSpPr/>
-        <p:nvPr/>
-      </p:nvGrpSpPr>
-      <p:grpSpPr>
-        <a:xfrm>
-          <a:off x="0" y="0"/>
-          <a:ext cx="0" cy="0"/>
-          <a:chOff x="0" y="0"/>
-          <a:chExt cx="0" cy="0"/>
-        </a:xfrm>
-      </p:grpSpPr>
-      <p:sp>
-        <p:nvSpPr>
-          <p:cNvPr id="2" name="Title 1"/>
-          <p:cNvSpPr>
-            <a:spLocks noGrp="1"/>
-          </p:cNvSpPr>
-          <p:nvPr>
-            <p:ph type="title"/>
-          </p:nvPr>
-        </p:nvSpPr>
-        <p:spPr/>
-        <p:txBody>
-          <a:bodyPr/>
-          <a:lstStyle/>
-          <a:p>
-            <a:pPr algn="ctr"/>
-            <a:r>
-              <a:rPr lang="en-US" dirty="0"/>
-              <a:t>findPhiPsi</a:t>
-            </a:r>
-          </a:p>
-        </p:txBody>
-      </p:sp>
-      <p:sp>
-        <p:nvSpPr>
-          <p:cNvPr id="3" name="Content Placeholder 2"/>
-          <p:cNvSpPr>
-            <a:spLocks noGrp="1"/>
-          </p:cNvSpPr>
-          <p:nvPr>
-            <p:ph idx="1"/>
-          </p:nvPr>
-        </p:nvSpPr>
-        <p:spPr/>
-        <p:txBody>
-          <a:bodyPr/>
-          <a:lstStyle/>
-          <a:p>
-            <a:r>
-              <a:rPr lang="en-US" dirty="0"/>
-              <a:t>Using “</a:t>
-            </a:r>
-            <a:r>
-              <a:rPr lang="en-US" dirty="0" err="1"/>
-              <a:t>arccos</a:t>
-            </a:r>
-            <a:r>
-              <a:rPr lang="en-US" dirty="0"/>
-              <a:t>” to find the angle from the world x-axis in the </a:t>
-            </a:r>
-            <a:r>
-              <a:rPr lang="en-US" dirty="0" err="1"/>
-              <a:t>zx</a:t>
-            </a:r>
-            <a:r>
-              <a:rPr lang="en-US" dirty="0"/>
-              <a:t>-plane (psi)</a:t>
-            </a:r>
-          </a:p>
-          <a:p>
-            <a:endParaRPr lang="en-US" dirty="0"/>
-          </a:p>
-          <a:p>
-            <a:r>
-              <a:rPr lang="en-US" dirty="0"/>
-              <a:t>Using “</a:t>
-            </a:r>
-            <a:r>
-              <a:rPr lang="en-US" dirty="0" err="1"/>
-              <a:t>arccos</a:t>
-            </a:r>
-            <a:r>
-              <a:rPr lang="en-US" dirty="0"/>
-              <a:t>” to find the angle from the world x-axis in the </a:t>
-            </a:r>
-            <a:r>
-              <a:rPr lang="en-US" dirty="0" err="1"/>
-              <a:t>xy</a:t>
-            </a:r>
-            <a:r>
-              <a:rPr lang="en-US" dirty="0"/>
-              <a:t>-plane (phi)</a:t>
-            </a:r>
-          </a:p>
-          <a:p>
-            <a:endParaRPr lang="en-US" dirty="0"/>
-          </a:p>
-        </p:txBody>
-      </p:sp>
-      <p:sp>
-        <p:nvSpPr>
-          <p:cNvPr id="4" name="Left Arrow 3"/>
-          <p:cNvSpPr/>
-          <p:nvPr/>
-        </p:nvSpPr>
-        <p:spPr>
-          <a:xfrm>
-            <a:off x="208444" y="114377"/>
-            <a:ext cx="1005840" cy="685800"/>
-          </a:xfrm>
-          <a:prstGeom prst="leftArrow">
-            <a:avLst/>
-          </a:prstGeom>
-          <a:solidFill>
-            <a:schemeClr val="bg1"/>
-          </a:solidFill>
-        </p:spPr>
-        <p:style>
-          <a:lnRef idx="2">
-            <a:schemeClr val="dk1">
-              <a:shade val="50000"/>
-            </a:schemeClr>
-          </a:lnRef>
-          <a:fillRef idx="1">
-            <a:schemeClr val="dk1"/>
-          </a:fillRef>
-          <a:effectRef idx="0">
-            <a:schemeClr val="dk1"/>
-          </a:effectRef>
-          <a:fontRef idx="minor">
-            <a:schemeClr val="lt1"/>
-          </a:fontRef>
-        </p:style>
-        <p:txBody>
-          <a:bodyPr rtlCol="0" anchor="ctr"/>
-          <a:lstStyle/>
-          <a:p>
-            <a:pPr algn="ctr"/>
-            <a:r>
-              <a:rPr lang="en-US" dirty="0">
-                <a:solidFill>
-                  <a:schemeClr val="tx1"/>
-                </a:solidFill>
-                <a:hlinkClick r:id="rId2" action="ppaction://hlinksldjump"/>
-              </a:rPr>
-              <a:t>MATH</a:t>
-            </a:r>
-            <a:endParaRPr lang="en-US" dirty="0">
-              <a:solidFill>
-                <a:schemeClr val="tx1"/>
-              </a:solidFill>
-            </a:endParaRPr>
-          </a:p>
-        </p:txBody>
-      </p:sp>
-    </p:spTree>
-    <p:extLst>
-      <p:ext uri="{BB962C8B-B14F-4D97-AF65-F5344CB8AC3E}">
-        <p14:creationId xmlns:p14="http://schemas.microsoft.com/office/powerpoint/2010/main" val="2602825239"/>
-      </p:ext>
-    </p:extLst>
-  </p:cSld>
-  <p:clrMapOvr>
-    <a:masterClrMapping/>
-  </p:clrMapOvr>
-</p:sld>
-</file>
-
-<file path=ppt/slides/slide18.xml><?xml version="1.0" encoding="utf-8"?>
-<p:sld xmlns:a="http://schemas.openxmlformats.org/drawingml/2006/main" xmlns:r="http://schemas.openxmlformats.org/officeDocument/2006/relationships" xmlns:p="http://schemas.openxmlformats.org/presentationml/2006/main">
-  <p:cSld>
-    <p:spTree>
-      <p:nvGrpSpPr>
-        <p:cNvPr id="1" name=""/>
-        <p:cNvGrpSpPr/>
-        <p:nvPr/>
-      </p:nvGrpSpPr>
-      <p:grpSpPr>
-        <a:xfrm>
-          <a:off x="0" y="0"/>
-          <a:ext cx="0" cy="0"/>
-          <a:chOff x="0" y="0"/>
-          <a:chExt cx="0" cy="0"/>
-        </a:xfrm>
-      </p:grpSpPr>
-      <p:sp>
-        <p:nvSpPr>
-          <p:cNvPr id="2" name="Title 1"/>
-          <p:cNvSpPr>
-            <a:spLocks noGrp="1"/>
-          </p:cNvSpPr>
-          <p:nvPr>
-            <p:ph type="title"/>
-          </p:nvPr>
-        </p:nvSpPr>
-        <p:spPr/>
-        <p:txBody>
-          <a:bodyPr/>
-          <a:lstStyle/>
-          <a:p>
-            <a:pPr algn="ctr"/>
-            <a:r>
-              <a:rPr lang="en-US" dirty="0"/>
-              <a:t>anglediff</a:t>
-            </a:r>
-          </a:p>
-        </p:txBody>
-      </p:sp>
-      <p:sp>
-        <p:nvSpPr>
-          <p:cNvPr id="3" name="Content Placeholder 2"/>
-          <p:cNvSpPr>
-            <a:spLocks noGrp="1"/>
-          </p:cNvSpPr>
-          <p:nvPr>
-            <p:ph idx="1"/>
-          </p:nvPr>
-        </p:nvSpPr>
-        <p:spPr/>
-        <p:txBody>
-          <a:bodyPr/>
-          <a:lstStyle/>
-          <a:p>
-            <a:r>
-              <a:rPr lang="en-US" dirty="0"/>
-              <a:t>Find the angle of the two vectors with respect to the world x-axis in the </a:t>
-            </a:r>
-            <a:r>
-              <a:rPr lang="en-US" dirty="0" err="1"/>
-              <a:t>xy</a:t>
-            </a:r>
-            <a:r>
-              <a:rPr lang="en-US" dirty="0"/>
-              <a:t>-plane</a:t>
-            </a:r>
-          </a:p>
-          <a:p>
-            <a:r>
-              <a:rPr lang="en-US" dirty="0"/>
-              <a:t>The difference between these two angles is the angle between vectors</a:t>
-            </a:r>
-          </a:p>
-          <a:p>
-            <a:endParaRPr lang="en-US" dirty="0"/>
-          </a:p>
-        </p:txBody>
-      </p:sp>
-      <p:sp>
-        <p:nvSpPr>
-          <p:cNvPr id="4" name="Left Arrow 3"/>
-          <p:cNvSpPr/>
-          <p:nvPr/>
-        </p:nvSpPr>
-        <p:spPr>
-          <a:xfrm>
-            <a:off x="208444" y="114377"/>
-            <a:ext cx="1005840" cy="685800"/>
-          </a:xfrm>
-          <a:prstGeom prst="leftArrow">
-            <a:avLst/>
-          </a:prstGeom>
-          <a:solidFill>
-            <a:schemeClr val="bg1"/>
-          </a:solidFill>
-        </p:spPr>
-        <p:style>
-          <a:lnRef idx="2">
-            <a:schemeClr val="dk1">
-              <a:shade val="50000"/>
-            </a:schemeClr>
-          </a:lnRef>
-          <a:fillRef idx="1">
-            <a:schemeClr val="dk1"/>
-          </a:fillRef>
-          <a:effectRef idx="0">
-            <a:schemeClr val="dk1"/>
-          </a:effectRef>
-          <a:fontRef idx="minor">
-            <a:schemeClr val="lt1"/>
-          </a:fontRef>
-        </p:style>
-        <p:txBody>
-          <a:bodyPr rtlCol="0" anchor="ctr"/>
-          <a:lstStyle/>
-          <a:p>
-            <a:pPr algn="ctr"/>
-            <a:r>
-              <a:rPr lang="en-US" dirty="0">
-                <a:solidFill>
-                  <a:schemeClr val="tx1"/>
-                </a:solidFill>
-                <a:hlinkClick r:id="rId2" action="ppaction://hlinksldjump"/>
-              </a:rPr>
-              <a:t>MATH</a:t>
-            </a:r>
-            <a:endParaRPr lang="en-US" dirty="0">
-              <a:solidFill>
-                <a:schemeClr val="tx1"/>
-              </a:solidFill>
-            </a:endParaRPr>
-          </a:p>
-        </p:txBody>
-      </p:sp>
-    </p:spTree>
-    <p:extLst>
-      <p:ext uri="{BB962C8B-B14F-4D97-AF65-F5344CB8AC3E}">
-        <p14:creationId xmlns:p14="http://schemas.microsoft.com/office/powerpoint/2010/main" val="3373987691"/>
-      </p:ext>
-    </p:extLst>
-  </p:cSld>
-  <p:clrMapOvr>
-    <a:masterClrMapping/>
-  </p:clrMapOvr>
-</p:sld>
-</file>
-
-<file path=ppt/slides/slide19.xml><?xml version="1.0" encoding="utf-8"?>
 <p:sld xmlns:a="http://schemas.openxmlformats.org/drawingml/2006/main" xmlns:r="http://schemas.openxmlformats.org/officeDocument/2006/relationships" xmlns:p="http://schemas.openxmlformats.org/presentationml/2006/main">
   <p:cSld>
     <p:spTree>
@@ -10490,6 +10159,277 @@
 </p:sld>
 </file>
 
+<file path=ppt/slides/slide18.xml><?xml version="1.0" encoding="utf-8"?>
+<p:sld xmlns:a="http://schemas.openxmlformats.org/drawingml/2006/main" xmlns:r="http://schemas.openxmlformats.org/officeDocument/2006/relationships" xmlns:p="http://schemas.openxmlformats.org/presentationml/2006/main">
+  <p:cSld>
+    <p:spTree>
+      <p:nvGrpSpPr>
+        <p:cNvPr id="1" name=""/>
+        <p:cNvGrpSpPr/>
+        <p:nvPr/>
+      </p:nvGrpSpPr>
+      <p:grpSpPr>
+        <a:xfrm>
+          <a:off x="0" y="0"/>
+          <a:ext cx="0" cy="0"/>
+          <a:chOff x="0" y="0"/>
+          <a:chExt cx="0" cy="0"/>
+        </a:xfrm>
+      </p:grpSpPr>
+      <p:sp>
+        <p:nvSpPr>
+          <p:cNvPr id="2" name="Title 1"/>
+          <p:cNvSpPr>
+            <a:spLocks noGrp="1"/>
+          </p:cNvSpPr>
+          <p:nvPr>
+            <p:ph type="title"/>
+          </p:nvPr>
+        </p:nvSpPr>
+        <p:spPr/>
+        <p:txBody>
+          <a:bodyPr/>
+          <a:lstStyle/>
+          <a:p>
+            <a:pPr algn="ctr"/>
+            <a:r>
+              <a:rPr lang="en-US" dirty="0"/>
+              <a:t>axis2rot</a:t>
+            </a:r>
+          </a:p>
+        </p:txBody>
+      </p:sp>
+      <p:sp>
+        <p:nvSpPr>
+          <p:cNvPr id="3" name="Content Placeholder 2"/>
+          <p:cNvSpPr>
+            <a:spLocks noGrp="1"/>
+          </p:cNvSpPr>
+          <p:nvPr>
+            <p:ph idx="1"/>
+          </p:nvPr>
+        </p:nvSpPr>
+        <p:spPr/>
+        <p:txBody>
+          <a:bodyPr/>
+          <a:lstStyle/>
+          <a:p>
+            <a:r>
+              <a:rPr lang="en-US" dirty="0"/>
+              <a:t>Converts from an axis angle notation of a rotation to a rotation matrix in 3D Euclidean space</a:t>
+            </a:r>
+          </a:p>
+          <a:p>
+            <a:endParaRPr lang="en-US" dirty="0"/>
+          </a:p>
+        </p:txBody>
+      </p:sp>
+      <p:sp>
+        <p:nvSpPr>
+          <p:cNvPr id="4" name="Left Arrow 3"/>
+          <p:cNvSpPr/>
+          <p:nvPr/>
+        </p:nvSpPr>
+        <p:spPr>
+          <a:xfrm>
+            <a:off x="208444" y="114377"/>
+            <a:ext cx="1005840" cy="685800"/>
+          </a:xfrm>
+          <a:prstGeom prst="leftArrow">
+            <a:avLst/>
+          </a:prstGeom>
+          <a:solidFill>
+            <a:schemeClr val="bg1"/>
+          </a:solidFill>
+        </p:spPr>
+        <p:style>
+          <a:lnRef idx="2">
+            <a:schemeClr val="dk1">
+              <a:shade val="50000"/>
+            </a:schemeClr>
+          </a:lnRef>
+          <a:fillRef idx="1">
+            <a:schemeClr val="dk1"/>
+          </a:fillRef>
+          <a:effectRef idx="0">
+            <a:schemeClr val="dk1"/>
+          </a:effectRef>
+          <a:fontRef idx="minor">
+            <a:schemeClr val="lt1"/>
+          </a:fontRef>
+        </p:style>
+        <p:txBody>
+          <a:bodyPr rtlCol="0" anchor="ctr"/>
+          <a:lstStyle/>
+          <a:p>
+            <a:pPr algn="ctr"/>
+            <a:r>
+              <a:rPr lang="en-US" dirty="0">
+                <a:solidFill>
+                  <a:schemeClr val="tx1"/>
+                </a:solidFill>
+                <a:hlinkClick r:id="rId2" action="ppaction://hlinksldjump"/>
+              </a:rPr>
+              <a:t>MATH</a:t>
+            </a:r>
+            <a:endParaRPr lang="en-US" dirty="0">
+              <a:solidFill>
+                <a:schemeClr val="tx1"/>
+              </a:solidFill>
+            </a:endParaRPr>
+          </a:p>
+        </p:txBody>
+      </p:sp>
+    </p:spTree>
+    <p:extLst>
+      <p:ext uri="{BB962C8B-B14F-4D97-AF65-F5344CB8AC3E}">
+        <p14:creationId xmlns:p14="http://schemas.microsoft.com/office/powerpoint/2010/main" val="1416073219"/>
+      </p:ext>
+    </p:extLst>
+  </p:cSld>
+  <p:clrMapOvr>
+    <a:masterClrMapping/>
+  </p:clrMapOvr>
+</p:sld>
+</file>
+
+<file path=ppt/slides/slide19.xml><?xml version="1.0" encoding="utf-8"?>
+<p:sld xmlns:a="http://schemas.openxmlformats.org/drawingml/2006/main" xmlns:r="http://schemas.openxmlformats.org/officeDocument/2006/relationships" xmlns:p="http://schemas.openxmlformats.org/presentationml/2006/main">
+  <p:cSld>
+    <p:spTree>
+      <p:nvGrpSpPr>
+        <p:cNvPr id="1" name=""/>
+        <p:cNvGrpSpPr/>
+        <p:nvPr/>
+      </p:nvGrpSpPr>
+      <p:grpSpPr>
+        <a:xfrm>
+          <a:off x="0" y="0"/>
+          <a:ext cx="0" cy="0"/>
+          <a:chOff x="0" y="0"/>
+          <a:chExt cx="0" cy="0"/>
+        </a:xfrm>
+      </p:grpSpPr>
+      <p:sp>
+        <p:nvSpPr>
+          <p:cNvPr id="2" name="Title 1"/>
+          <p:cNvSpPr>
+            <a:spLocks noGrp="1"/>
+          </p:cNvSpPr>
+          <p:nvPr>
+            <p:ph type="title"/>
+          </p:nvPr>
+        </p:nvSpPr>
+        <p:spPr/>
+        <p:txBody>
+          <a:bodyPr/>
+          <a:lstStyle/>
+          <a:p>
+            <a:pPr algn="ctr"/>
+            <a:r>
+              <a:rPr lang="en-US" dirty="0"/>
+              <a:t>rot2axis</a:t>
+            </a:r>
+          </a:p>
+        </p:txBody>
+      </p:sp>
+      <p:sp>
+        <p:nvSpPr>
+          <p:cNvPr id="3" name="Content Placeholder 2"/>
+          <p:cNvSpPr>
+            <a:spLocks noGrp="1"/>
+          </p:cNvSpPr>
+          <p:nvPr>
+            <p:ph idx="1"/>
+          </p:nvPr>
+        </p:nvSpPr>
+        <p:spPr/>
+        <p:txBody>
+          <a:bodyPr/>
+          <a:lstStyle/>
+          <a:p>
+            <a:r>
+              <a:rPr lang="en-US" dirty="0"/>
+              <a:t>Converts from a rotation matrix to an axis angle notation for rotation  in 3D Euclidean space</a:t>
+            </a:r>
+          </a:p>
+          <a:p>
+            <a:endParaRPr lang="en-US" dirty="0"/>
+          </a:p>
+          <a:p>
+            <a:endParaRPr lang="en-US" dirty="0"/>
+          </a:p>
+        </p:txBody>
+      </p:sp>
+      <p:sp>
+        <p:nvSpPr>
+          <p:cNvPr id="4" name="Left Arrow 3"/>
+          <p:cNvSpPr/>
+          <p:nvPr/>
+        </p:nvSpPr>
+        <p:spPr>
+          <a:xfrm>
+            <a:off x="208444" y="114377"/>
+            <a:ext cx="1005840" cy="685800"/>
+          </a:xfrm>
+          <a:prstGeom prst="leftArrow">
+            <a:avLst/>
+          </a:prstGeom>
+          <a:solidFill>
+            <a:schemeClr val="bg1"/>
+          </a:solidFill>
+        </p:spPr>
+        <p:style>
+          <a:lnRef idx="2">
+            <a:schemeClr val="dk1">
+              <a:shade val="50000"/>
+            </a:schemeClr>
+          </a:lnRef>
+          <a:fillRef idx="1">
+            <a:schemeClr val="dk1"/>
+          </a:fillRef>
+          <a:effectRef idx="0">
+            <a:schemeClr val="dk1"/>
+          </a:effectRef>
+          <a:fontRef idx="minor">
+            <a:schemeClr val="lt1"/>
+          </a:fontRef>
+        </p:style>
+        <p:txBody>
+          <a:bodyPr rtlCol="0" anchor="ctr"/>
+          <a:lstStyle/>
+          <a:p>
+            <a:pPr algn="ctr"/>
+            <a:r>
+              <a:rPr lang="en-US" dirty="0">
+                <a:solidFill>
+                  <a:schemeClr val="tx1"/>
+                </a:solidFill>
+                <a:hlinkClick r:id="rId2" action="ppaction://hlinksldjump"/>
+              </a:rPr>
+              <a:t>MATH</a:t>
+            </a:r>
+            <a:endParaRPr lang="en-US" dirty="0">
+              <a:solidFill>
+                <a:schemeClr val="tx1"/>
+              </a:solidFill>
+            </a:endParaRPr>
+          </a:p>
+        </p:txBody>
+      </p:sp>
+    </p:spTree>
+    <p:extLst>
+      <p:ext uri="{BB962C8B-B14F-4D97-AF65-F5344CB8AC3E}">
+        <p14:creationId xmlns:p14="http://schemas.microsoft.com/office/powerpoint/2010/main" val="2935178133"/>
+      </p:ext>
+    </p:extLst>
+  </p:cSld>
+  <p:clrMapOvr>
+    <a:masterClrMapping/>
+  </p:clrMapOvr>
+</p:sld>
+</file>
+
 <file path=ppt/slides/slide2.xml><?xml version="1.0" encoding="utf-8"?>
 <p:sld xmlns:a="http://schemas.openxmlformats.org/drawingml/2006/main" xmlns:r="http://schemas.openxmlformats.org/officeDocument/2006/relationships" xmlns:p="http://schemas.openxmlformats.org/presentationml/2006/main">
   <p:cSld>
@@ -10690,7 +10630,7 @@
                     <a:schemeClr val="bg1"/>
                   </a:solidFill>
                 </a:rPr>
-                <a:t>	Trajectory Shape Function that rolls the ball through a specific trajectory. Using CNTRL it returns a VISUAL &amp; DATA</a:t>
+                <a:t>	Trajectory Shape Function that rolls the ball through a specific trajectory. Using CNTRL it returns VISUAL &amp; DATA</a:t>
               </a:r>
             </a:p>
             <a:p>
@@ -10778,7 +10718,7 @@
                     <a:schemeClr val="bg1"/>
                   </a:solidFill>
                 </a:rPr>
-                <a:t>Tools (</a:t>
+                <a:t>functions(</a:t>
               </a:r>
               <a:r>
                 <a:rPr lang="en-US" sz="2000" dirty="0" err="1">
@@ -10925,7 +10865,7 @@
             <a:pPr algn="ctr"/>
             <a:r>
               <a:rPr lang="en-US" dirty="0"/>
-              <a:t>axis2rot</a:t>
+              <a:t>rot2quat</a:t>
             </a:r>
           </a:p>
         </p:txBody>
@@ -10947,74 +10887,15 @@
           <a:p>
             <a:r>
               <a:rPr lang="en-US" dirty="0"/>
-              <a:t>Converts from an axis angle notation of a rotation to a rotation matrix in 3D Euclidean space</a:t>
-            </a:r>
-          </a:p>
-          <a:p>
-            <a:endParaRPr lang="en-US" dirty="0"/>
-          </a:p>
-        </p:txBody>
-      </p:sp>
-      <p:sp>
-        <p:nvSpPr>
-          <p:cNvPr id="4" name="Left Arrow 3"/>
-          <p:cNvSpPr/>
-          <p:nvPr/>
-        </p:nvSpPr>
-        <p:spPr>
-          <a:xfrm>
-            <a:off x="208444" y="114377"/>
-            <a:ext cx="1005840" cy="685800"/>
-          </a:xfrm>
-          <a:prstGeom prst="leftArrow">
-            <a:avLst/>
-          </a:prstGeom>
-          <a:solidFill>
-            <a:schemeClr val="bg1"/>
-          </a:solidFill>
-        </p:spPr>
-        <p:style>
-          <a:lnRef idx="2">
-            <a:schemeClr val="dk1">
-              <a:shade val="50000"/>
-            </a:schemeClr>
-          </a:lnRef>
-          <a:fillRef idx="1">
-            <a:schemeClr val="dk1"/>
-          </a:fillRef>
-          <a:effectRef idx="0">
-            <a:schemeClr val="dk1"/>
-          </a:effectRef>
-          <a:fontRef idx="minor">
-            <a:schemeClr val="lt1"/>
-          </a:fontRef>
-        </p:style>
-        <p:txBody>
-          <a:bodyPr rtlCol="0" anchor="ctr"/>
-          <a:lstStyle/>
-          <a:p>
-            <a:pPr algn="ctr"/>
-            <a:r>
-              <a:rPr lang="en-US" dirty="0">
-                <a:solidFill>
-                  <a:schemeClr val="tx1"/>
-                </a:solidFill>
-                <a:hlinkClick r:id="rId2" action="ppaction://hlinksldjump"/>
-              </a:rPr>
-              <a:t>MATH</a:t>
-            </a:r>
-            <a:endParaRPr lang="en-US" dirty="0">
-              <a:solidFill>
-                <a:schemeClr val="tx1"/>
-              </a:solidFill>
-            </a:endParaRPr>
+              <a:t>Converts a rotation matrix into its quaternion form</a:t>
+            </a:r>
           </a:p>
         </p:txBody>
       </p:sp>
     </p:spTree>
     <p:extLst>
       <p:ext uri="{BB962C8B-B14F-4D97-AF65-F5344CB8AC3E}">
-        <p14:creationId xmlns:p14="http://schemas.microsoft.com/office/powerpoint/2010/main" val="1416073219"/>
+        <p14:creationId xmlns:p14="http://schemas.microsoft.com/office/powerpoint/2010/main" val="1627900376"/>
       </p:ext>
     </p:extLst>
   </p:cSld>
@@ -11059,7 +10940,7 @@
             <a:pPr algn="ctr"/>
             <a:r>
               <a:rPr lang="en-US" dirty="0"/>
-              <a:t>rot2axis</a:t>
+              <a:t>quatmult</a:t>
             </a:r>
           </a:p>
         </p:txBody>
@@ -11081,226 +10962,6 @@
           <a:p>
             <a:r>
               <a:rPr lang="en-US" dirty="0"/>
-              <a:t>Converts from a rotation matrix to an axis angle notation for rotation  in 3D </a:t>
-            </a:r>
-            <a:r>
-              <a:rPr lang="en-US" dirty="0" err="1"/>
-              <a:t>euclidean</a:t>
-            </a:r>
-            <a:r>
-              <a:rPr lang="en-US" dirty="0"/>
-              <a:t> space</a:t>
-            </a:r>
-          </a:p>
-          <a:p>
-            <a:endParaRPr lang="en-US" dirty="0"/>
-          </a:p>
-          <a:p>
-            <a:endParaRPr lang="en-US" dirty="0"/>
-          </a:p>
-        </p:txBody>
-      </p:sp>
-      <p:sp>
-        <p:nvSpPr>
-          <p:cNvPr id="4" name="Left Arrow 3"/>
-          <p:cNvSpPr/>
-          <p:nvPr/>
-        </p:nvSpPr>
-        <p:spPr>
-          <a:xfrm>
-            <a:off x="208444" y="114377"/>
-            <a:ext cx="1005840" cy="685800"/>
-          </a:xfrm>
-          <a:prstGeom prst="leftArrow">
-            <a:avLst/>
-          </a:prstGeom>
-          <a:solidFill>
-            <a:schemeClr val="bg1"/>
-          </a:solidFill>
-        </p:spPr>
-        <p:style>
-          <a:lnRef idx="2">
-            <a:schemeClr val="dk1">
-              <a:shade val="50000"/>
-            </a:schemeClr>
-          </a:lnRef>
-          <a:fillRef idx="1">
-            <a:schemeClr val="dk1"/>
-          </a:fillRef>
-          <a:effectRef idx="0">
-            <a:schemeClr val="dk1"/>
-          </a:effectRef>
-          <a:fontRef idx="minor">
-            <a:schemeClr val="lt1"/>
-          </a:fontRef>
-        </p:style>
-        <p:txBody>
-          <a:bodyPr rtlCol="0" anchor="ctr"/>
-          <a:lstStyle/>
-          <a:p>
-            <a:pPr algn="ctr"/>
-            <a:r>
-              <a:rPr lang="en-US" dirty="0">
-                <a:solidFill>
-                  <a:schemeClr val="tx1"/>
-                </a:solidFill>
-                <a:hlinkClick r:id="rId2" action="ppaction://hlinksldjump"/>
-              </a:rPr>
-              <a:t>MATH</a:t>
-            </a:r>
-            <a:endParaRPr lang="en-US" dirty="0">
-              <a:solidFill>
-                <a:schemeClr val="tx1"/>
-              </a:solidFill>
-            </a:endParaRPr>
-          </a:p>
-        </p:txBody>
-      </p:sp>
-    </p:spTree>
-    <p:extLst>
-      <p:ext uri="{BB962C8B-B14F-4D97-AF65-F5344CB8AC3E}">
-        <p14:creationId xmlns:p14="http://schemas.microsoft.com/office/powerpoint/2010/main" val="2935178133"/>
-      </p:ext>
-    </p:extLst>
-  </p:cSld>
-  <p:clrMapOvr>
-    <a:masterClrMapping/>
-  </p:clrMapOvr>
-</p:sld>
-</file>
-
-<file path=ppt/slides/slide22.xml><?xml version="1.0" encoding="utf-8"?>
-<p:sld xmlns:a="http://schemas.openxmlformats.org/drawingml/2006/main" xmlns:r="http://schemas.openxmlformats.org/officeDocument/2006/relationships" xmlns:p="http://schemas.openxmlformats.org/presentationml/2006/main">
-  <p:cSld>
-    <p:spTree>
-      <p:nvGrpSpPr>
-        <p:cNvPr id="1" name=""/>
-        <p:cNvGrpSpPr/>
-        <p:nvPr/>
-      </p:nvGrpSpPr>
-      <p:grpSpPr>
-        <a:xfrm>
-          <a:off x="0" y="0"/>
-          <a:ext cx="0" cy="0"/>
-          <a:chOff x="0" y="0"/>
-          <a:chExt cx="0" cy="0"/>
-        </a:xfrm>
-      </p:grpSpPr>
-      <p:sp>
-        <p:nvSpPr>
-          <p:cNvPr id="2" name="Title 1"/>
-          <p:cNvSpPr>
-            <a:spLocks noGrp="1"/>
-          </p:cNvSpPr>
-          <p:nvPr>
-            <p:ph type="title"/>
-          </p:nvPr>
-        </p:nvSpPr>
-        <p:spPr/>
-        <p:txBody>
-          <a:bodyPr/>
-          <a:lstStyle/>
-          <a:p>
-            <a:pPr algn="ctr"/>
-            <a:r>
-              <a:rPr lang="en-US" dirty="0"/>
-              <a:t>rot2quat</a:t>
-            </a:r>
-          </a:p>
-        </p:txBody>
-      </p:sp>
-      <p:sp>
-        <p:nvSpPr>
-          <p:cNvPr id="3" name="Content Placeholder 2"/>
-          <p:cNvSpPr>
-            <a:spLocks noGrp="1"/>
-          </p:cNvSpPr>
-          <p:nvPr>
-            <p:ph idx="1"/>
-          </p:nvPr>
-        </p:nvSpPr>
-        <p:spPr/>
-        <p:txBody>
-          <a:bodyPr/>
-          <a:lstStyle/>
-          <a:p>
-            <a:r>
-              <a:rPr lang="en-US" dirty="0"/>
-              <a:t>Converts a rotation matrix into its quaternion form</a:t>
-            </a:r>
-          </a:p>
-        </p:txBody>
-      </p:sp>
-    </p:spTree>
-    <p:extLst>
-      <p:ext uri="{BB962C8B-B14F-4D97-AF65-F5344CB8AC3E}">
-        <p14:creationId xmlns:p14="http://schemas.microsoft.com/office/powerpoint/2010/main" val="1627900376"/>
-      </p:ext>
-    </p:extLst>
-  </p:cSld>
-  <p:clrMapOvr>
-    <a:masterClrMapping/>
-  </p:clrMapOvr>
-</p:sld>
-</file>
-
-<file path=ppt/slides/slide23.xml><?xml version="1.0" encoding="utf-8"?>
-<p:sld xmlns:a="http://schemas.openxmlformats.org/drawingml/2006/main" xmlns:r="http://schemas.openxmlformats.org/officeDocument/2006/relationships" xmlns:p="http://schemas.openxmlformats.org/presentationml/2006/main">
-  <p:cSld>
-    <p:spTree>
-      <p:nvGrpSpPr>
-        <p:cNvPr id="1" name=""/>
-        <p:cNvGrpSpPr/>
-        <p:nvPr/>
-      </p:nvGrpSpPr>
-      <p:grpSpPr>
-        <a:xfrm>
-          <a:off x="0" y="0"/>
-          <a:ext cx="0" cy="0"/>
-          <a:chOff x="0" y="0"/>
-          <a:chExt cx="0" cy="0"/>
-        </a:xfrm>
-      </p:grpSpPr>
-      <p:sp>
-        <p:nvSpPr>
-          <p:cNvPr id="2" name="Title 1"/>
-          <p:cNvSpPr>
-            <a:spLocks noGrp="1"/>
-          </p:cNvSpPr>
-          <p:nvPr>
-            <p:ph type="title"/>
-          </p:nvPr>
-        </p:nvSpPr>
-        <p:spPr/>
-        <p:txBody>
-          <a:bodyPr/>
-          <a:lstStyle/>
-          <a:p>
-            <a:pPr algn="ctr"/>
-            <a:r>
-              <a:rPr lang="en-US" dirty="0"/>
-              <a:t>quatmult</a:t>
-            </a:r>
-          </a:p>
-        </p:txBody>
-      </p:sp>
-      <p:sp>
-        <p:nvSpPr>
-          <p:cNvPr id="3" name="Content Placeholder 2"/>
-          <p:cNvSpPr>
-            <a:spLocks noGrp="1"/>
-          </p:cNvSpPr>
-          <p:nvPr>
-            <p:ph idx="1"/>
-          </p:nvPr>
-        </p:nvSpPr>
-        <p:spPr/>
-        <p:txBody>
-          <a:bodyPr/>
-          <a:lstStyle/>
-          <a:p>
-            <a:r>
-              <a:rPr lang="en-US" dirty="0"/>
               <a:t>A function that multiplies two quaternions</a:t>
             </a:r>
           </a:p>
@@ -11319,7 +10980,7 @@
 </p:sld>
 </file>
 
-<file path=ppt/slides/slide24.xml><?xml version="1.0" encoding="utf-8"?>
+<file path=ppt/slides/slide22.xml><?xml version="1.0" encoding="utf-8"?>
 <p:sld xmlns:a="http://schemas.openxmlformats.org/drawingml/2006/main" xmlns:r="http://schemas.openxmlformats.org/officeDocument/2006/relationships" xmlns:p="http://schemas.openxmlformats.org/presentationml/2006/main">
   <p:cSld>
     <p:spTree>
@@ -11519,7 +11180,7 @@
 </p:sld>
 </file>
 
-<file path=ppt/slides/slide25.xml><?xml version="1.0" encoding="utf-8"?>
+<file path=ppt/slides/slide23.xml><?xml version="1.0" encoding="utf-8"?>
 <p:sld xmlns:a="http://schemas.openxmlformats.org/drawingml/2006/main" xmlns:r="http://schemas.openxmlformats.org/officeDocument/2006/relationships" xmlns:p="http://schemas.openxmlformats.org/presentationml/2006/main">
   <p:cSld>
     <p:spTree>
@@ -11751,6 +11412,245 @@
     <p:extLst>
       <p:ext uri="{BB962C8B-B14F-4D97-AF65-F5344CB8AC3E}">
         <p14:creationId xmlns:p14="http://schemas.microsoft.com/office/powerpoint/2010/main" val="3951806904"/>
+      </p:ext>
+    </p:extLst>
+  </p:cSld>
+  <p:clrMapOvr>
+    <a:masterClrMapping/>
+  </p:clrMapOvr>
+</p:sld>
+</file>
+
+<file path=ppt/slides/slide24.xml><?xml version="1.0" encoding="utf-8"?>
+<p:sld xmlns:a="http://schemas.openxmlformats.org/drawingml/2006/main" xmlns:r="http://schemas.openxmlformats.org/officeDocument/2006/relationships" xmlns:p="http://schemas.openxmlformats.org/presentationml/2006/main">
+  <p:cSld>
+    <p:spTree>
+      <p:nvGrpSpPr>
+        <p:cNvPr id="1" name=""/>
+        <p:cNvGrpSpPr/>
+        <p:nvPr/>
+      </p:nvGrpSpPr>
+      <p:grpSpPr>
+        <a:xfrm>
+          <a:off x="0" y="0"/>
+          <a:ext cx="0" cy="0"/>
+          <a:chOff x="0" y="0"/>
+          <a:chExt cx="0" cy="0"/>
+        </a:xfrm>
+      </p:grpSpPr>
+      <p:sp>
+        <p:nvSpPr>
+          <p:cNvPr id="2" name="Title 1"/>
+          <p:cNvSpPr>
+            <a:spLocks noGrp="1"/>
+          </p:cNvSpPr>
+          <p:nvPr>
+            <p:ph type="title"/>
+          </p:nvPr>
+        </p:nvSpPr>
+        <p:spPr/>
+        <p:txBody>
+          <a:bodyPr/>
+          <a:lstStyle/>
+          <a:p>
+            <a:pPr algn="ctr"/>
+            <a:r>
+              <a:rPr lang="en-US" dirty="0"/>
+              <a:t>plot_ball</a:t>
+            </a:r>
+          </a:p>
+        </p:txBody>
+      </p:sp>
+      <p:sp>
+        <p:nvSpPr>
+          <p:cNvPr id="3" name="Content Placeholder 2"/>
+          <p:cNvSpPr>
+            <a:spLocks noGrp="1"/>
+          </p:cNvSpPr>
+          <p:nvPr>
+            <p:ph idx="1"/>
+          </p:nvPr>
+        </p:nvSpPr>
+        <p:spPr/>
+        <p:txBody>
+          <a:bodyPr/>
+          <a:lstStyle/>
+          <a:p>
+            <a:r>
+              <a:rPr lang="en-US" dirty="0"/>
+              <a:t>First Call creates a figure of equal axis at a corner view </a:t>
+            </a:r>
+          </a:p>
+          <a:p>
+            <a:r>
+              <a:rPr lang="en-US" dirty="0"/>
+              <a:t>Draws a transparent sphere </a:t>
+            </a:r>
+          </a:p>
+          <a:p>
+            <a:r>
+              <a:rPr lang="en-US" dirty="0"/>
+              <a:t>Draws a quiver along the z-axis and y-axis of the magnetic field</a:t>
+            </a:r>
+          </a:p>
+          <a:p>
+            <a:r>
+              <a:rPr lang="en-US" dirty="0"/>
+              <a:t>Then transforms it using a homogeneous matrix (</a:t>
+            </a:r>
+            <a:r>
+              <a:rPr lang="en-US" dirty="0" err="1"/>
+              <a:t>MATLAB:hgtransform</a:t>
+            </a:r>
+            <a:r>
+              <a:rPr lang="en-US" dirty="0"/>
+              <a:t>)</a:t>
+            </a:r>
+          </a:p>
+          <a:p>
+            <a:endParaRPr lang="en-US" dirty="0"/>
+          </a:p>
+        </p:txBody>
+      </p:sp>
+      <p:sp>
+        <p:nvSpPr>
+          <p:cNvPr id="5" name="Left Arrow 4"/>
+          <p:cNvSpPr/>
+          <p:nvPr/>
+        </p:nvSpPr>
+        <p:spPr>
+          <a:xfrm>
+            <a:off x="208443" y="114377"/>
+            <a:ext cx="1116857" cy="685800"/>
+          </a:xfrm>
+          <a:prstGeom prst="leftArrow">
+            <a:avLst/>
+          </a:prstGeom>
+          <a:solidFill>
+            <a:schemeClr val="bg1"/>
+          </a:solidFill>
+        </p:spPr>
+        <p:style>
+          <a:lnRef idx="2">
+            <a:schemeClr val="dk1">
+              <a:shade val="50000"/>
+            </a:schemeClr>
+          </a:lnRef>
+          <a:fillRef idx="1">
+            <a:schemeClr val="dk1"/>
+          </a:fillRef>
+          <a:effectRef idx="0">
+            <a:schemeClr val="dk1"/>
+          </a:effectRef>
+          <a:fontRef idx="minor">
+            <a:schemeClr val="lt1"/>
+          </a:fontRef>
+        </p:style>
+        <p:txBody>
+          <a:bodyPr rtlCol="0" anchor="ctr"/>
+          <a:lstStyle/>
+          <a:p>
+            <a:pPr algn="ctr"/>
+            <a:r>
+              <a:rPr lang="en-US" dirty="0">
+                <a:solidFill>
+                  <a:schemeClr val="tx1"/>
+                </a:solidFill>
+                <a:hlinkClick r:id="rId2" action="ppaction://hlinksldjump"/>
+              </a:rPr>
+              <a:t>VISUAL</a:t>
+            </a:r>
+            <a:endParaRPr lang="en-US" dirty="0">
+              <a:solidFill>
+                <a:schemeClr val="tx1"/>
+              </a:solidFill>
+            </a:endParaRPr>
+          </a:p>
+        </p:txBody>
+      </p:sp>
+    </p:spTree>
+    <p:extLst>
+      <p:ext uri="{BB962C8B-B14F-4D97-AF65-F5344CB8AC3E}">
+        <p14:creationId xmlns:p14="http://schemas.microsoft.com/office/powerpoint/2010/main" val="879643288"/>
+      </p:ext>
+    </p:extLst>
+  </p:cSld>
+  <p:clrMapOvr>
+    <a:masterClrMapping/>
+  </p:clrMapOvr>
+</p:sld>
+</file>
+
+<file path=ppt/slides/slide25.xml><?xml version="1.0" encoding="utf-8"?>
+<p:sld xmlns:a="http://schemas.openxmlformats.org/drawingml/2006/main" xmlns:r="http://schemas.openxmlformats.org/officeDocument/2006/relationships" xmlns:p="http://schemas.openxmlformats.org/presentationml/2006/main">
+  <p:cSld>
+    <p:spTree>
+      <p:nvGrpSpPr>
+        <p:cNvPr id="1" name=""/>
+        <p:cNvGrpSpPr/>
+        <p:nvPr/>
+      </p:nvGrpSpPr>
+      <p:grpSpPr>
+        <a:xfrm>
+          <a:off x="0" y="0"/>
+          <a:ext cx="0" cy="0"/>
+          <a:chOff x="0" y="0"/>
+          <a:chExt cx="0" cy="0"/>
+        </a:xfrm>
+      </p:grpSpPr>
+      <p:sp>
+        <p:nvSpPr>
+          <p:cNvPr id="2" name="Title 1"/>
+          <p:cNvSpPr>
+            <a:spLocks noGrp="1"/>
+          </p:cNvSpPr>
+          <p:nvPr>
+            <p:ph type="title"/>
+          </p:nvPr>
+        </p:nvSpPr>
+        <p:spPr/>
+        <p:txBody>
+          <a:bodyPr/>
+          <a:lstStyle/>
+          <a:p>
+            <a:pPr algn="ctr"/>
+            <a:r>
+              <a:rPr lang="en-US" dirty="0" err="1"/>
+              <a:t>Showmagfield</a:t>
+            </a:r>
+            <a:r>
+              <a:rPr lang="en-US" dirty="0"/>
+              <a:t>(Not Functional)</a:t>
+            </a:r>
+          </a:p>
+        </p:txBody>
+      </p:sp>
+      <p:sp>
+        <p:nvSpPr>
+          <p:cNvPr id="3" name="Content Placeholder 2"/>
+          <p:cNvSpPr>
+            <a:spLocks noGrp="1"/>
+          </p:cNvSpPr>
+          <p:nvPr>
+            <p:ph idx="1"/>
+          </p:nvPr>
+        </p:nvSpPr>
+        <p:spPr/>
+        <p:txBody>
+          <a:bodyPr/>
+          <a:lstStyle/>
+          <a:p>
+            <a:r>
+              <a:rPr lang="en-US" dirty="0"/>
+              <a:t>Draws a magnetic field line using a series of 200 segments (quivers) from head to tail </a:t>
+            </a:r>
+          </a:p>
+        </p:txBody>
+      </p:sp>
+    </p:spTree>
+    <p:extLst>
+      <p:ext uri="{BB962C8B-B14F-4D97-AF65-F5344CB8AC3E}">
+        <p14:creationId xmlns:p14="http://schemas.microsoft.com/office/powerpoint/2010/main" val="411788964"/>
       </p:ext>
     </p:extLst>
   </p:cSld>
@@ -11794,9 +11694,10 @@
           <a:p>
             <a:pPr algn="ctr"/>
             <a:r>
-              <a:rPr lang="en-US" dirty="0"/>
-              <a:t>plot_ball</a:t>
-            </a:r>
+              <a:rPr lang="en-US" dirty="0" err="1"/>
+              <a:t>magfield</a:t>
+            </a:r>
+            <a:endParaRPr lang="en-US" dirty="0"/>
           </a:p>
         </p:txBody>
       </p:sp>
@@ -11817,100 +11718,38 @@
           <a:p>
             <a:r>
               <a:rPr lang="en-US" dirty="0"/>
-              <a:t>First Call creates a figure of equal axis at a corner view </a:t>
-            </a:r>
+              <a:t>Draws the magnetic field based on the solenoid current</a:t>
+            </a:r>
+          </a:p>
+          <a:p>
+            <a:endParaRPr lang="en-US" dirty="0"/>
           </a:p>
           <a:p>
             <a:r>
               <a:rPr lang="en-US" dirty="0"/>
-              <a:t>Draws a transparent sphere </a:t>
-            </a:r>
-          </a:p>
-          <a:p>
+              <a:t>NOTE: Does not use </a:t>
+            </a:r>
+            <a:r>
+              <a:rPr lang="en-US" dirty="0" err="1"/>
+              <a:t>meshgrid</a:t>
+            </a:r>
             <a:r>
               <a:rPr lang="en-US" dirty="0"/>
-              <a:t>Draws a quiver along the z-axis and y-axis of the magnetic field</a:t>
+              <a:t> </a:t>
             </a:r>
           </a:p>
           <a:p>
             <a:r>
               <a:rPr lang="en-US" dirty="0"/>
-              <a:t>Then transforms it using a homogeneous matrix (</a:t>
-            </a:r>
-            <a:r>
-              <a:rPr lang="en-US" dirty="0" err="1"/>
-              <a:t>MATLAB:hgtransform</a:t>
-            </a:r>
-            <a:r>
-              <a:rPr lang="en-US" dirty="0"/>
-              <a:t>)</a:t>
-            </a:r>
-          </a:p>
-          <a:p>
-            <a:endParaRPr lang="en-US" dirty="0"/>
-          </a:p>
-        </p:txBody>
-      </p:sp>
-      <p:sp>
-        <p:nvSpPr>
-          <p:cNvPr id="5" name="Left Arrow 4"/>
-          <p:cNvSpPr/>
-          <p:nvPr/>
-        </p:nvSpPr>
-        <p:spPr>
-          <a:xfrm>
-            <a:off x="208443" y="114377"/>
-            <a:ext cx="1116857" cy="685800"/>
-          </a:xfrm>
-          <a:prstGeom prst="leftArrow">
-            <a:avLst/>
-          </a:prstGeom>
-          <a:solidFill>
-            <a:schemeClr val="bg1"/>
-          </a:solidFill>
-        </p:spPr>
-        <p:style>
-          <a:lnRef idx="2">
-            <a:schemeClr val="dk1">
-              <a:shade val="50000"/>
-            </a:schemeClr>
-          </a:lnRef>
-          <a:fillRef idx="1">
-            <a:schemeClr val="dk1"/>
-          </a:fillRef>
-          <a:effectRef idx="0">
-            <a:schemeClr val="dk1"/>
-          </a:effectRef>
-          <a:fontRef idx="minor">
-            <a:schemeClr val="lt1"/>
-          </a:fontRef>
-        </p:style>
-        <p:txBody>
-          <a:bodyPr rtlCol="0" anchor="ctr"/>
-          <a:lstStyle/>
-          <a:p>
-            <a:pPr algn="ctr"/>
-            <a:r>
-              <a:rPr lang="en-US" dirty="0">
-                <a:solidFill>
-                  <a:schemeClr val="tx1"/>
-                </a:solidFill>
-                <a:hlinkClick r:id="rId2" action="ppaction://hlinksldjump"/>
-              </a:rPr>
-              <a:t>VISUAL</a:t>
-            </a:r>
-            <a:endParaRPr lang="en-US" dirty="0">
-              <a:solidFill>
-                <a:schemeClr val="tx1"/>
-              </a:solidFill>
-            </a:endParaRPr>
+              <a:t>NOTE: The entire field is pointing in one direction (which may be incorrect)</a:t>
+            </a:r>
           </a:p>
         </p:txBody>
       </p:sp>
     </p:spTree>
     <p:extLst>
       <p:ext uri="{BB962C8B-B14F-4D97-AF65-F5344CB8AC3E}">
-        <p14:creationId xmlns:p14="http://schemas.microsoft.com/office/powerpoint/2010/main" val="879643288"/>
+        <p14:creationId xmlns:p14="http://schemas.microsoft.com/office/powerpoint/2010/main" val="2423817445"/>
       </p:ext>
     </p:extLst>
   </p:cSld>
@@ -11952,12 +11791,10 @@
           <a:bodyPr/>
           <a:lstStyle/>
           <a:p>
-            <a:pPr algn="ctr"/>
-            <a:r>
-              <a:rPr lang="en-US" dirty="0" err="1"/>
-              <a:t>showmagfield</a:t>
-            </a:r>
-            <a:endParaRPr lang="en-US" dirty="0"/>
+            <a:r>
+              <a:rPr lang="en-US" dirty="0"/>
+              <a:t>DATA</a:t>
+            </a:r>
           </a:p>
         </p:txBody>
       </p:sp>
@@ -11978,217 +11815,7 @@
           <a:p>
             <a:r>
               <a:rPr lang="en-US" dirty="0"/>
-              <a:t>Draws a magnetic field line using a </a:t>
-            </a:r>
-            <a:r>
-              <a:rPr lang="en-US"/>
-              <a:t>series of 200 </a:t>
-            </a:r>
-            <a:r>
-              <a:rPr lang="en-US" dirty="0"/>
-              <a:t>segments (quivers) </a:t>
-            </a:r>
-            <a:r>
-              <a:rPr lang="en-US"/>
-              <a:t>from head to tail </a:t>
-            </a:r>
-            <a:endParaRPr lang="en-US" dirty="0"/>
-          </a:p>
-        </p:txBody>
-      </p:sp>
-    </p:spTree>
-    <p:extLst>
-      <p:ext uri="{BB962C8B-B14F-4D97-AF65-F5344CB8AC3E}">
-        <p14:creationId xmlns:p14="http://schemas.microsoft.com/office/powerpoint/2010/main" val="411788964"/>
-      </p:ext>
-    </p:extLst>
-  </p:cSld>
-  <p:clrMapOvr>
-    <a:masterClrMapping/>
-  </p:clrMapOvr>
-</p:sld>
-</file>
-
-<file path=ppt/slides/slide28.xml><?xml version="1.0" encoding="utf-8"?>
-<p:sld xmlns:a="http://schemas.openxmlformats.org/drawingml/2006/main" xmlns:r="http://schemas.openxmlformats.org/officeDocument/2006/relationships" xmlns:p="http://schemas.openxmlformats.org/presentationml/2006/main">
-  <p:cSld>
-    <p:spTree>
-      <p:nvGrpSpPr>
-        <p:cNvPr id="1" name=""/>
-        <p:cNvGrpSpPr/>
-        <p:nvPr/>
-      </p:nvGrpSpPr>
-      <p:grpSpPr>
-        <a:xfrm>
-          <a:off x="0" y="0"/>
-          <a:ext cx="0" cy="0"/>
-          <a:chOff x="0" y="0"/>
-          <a:chExt cx="0" cy="0"/>
-        </a:xfrm>
-      </p:grpSpPr>
-      <p:sp>
-        <p:nvSpPr>
-          <p:cNvPr id="2" name="Title 1"/>
-          <p:cNvSpPr>
-            <a:spLocks noGrp="1"/>
-          </p:cNvSpPr>
-          <p:nvPr>
-            <p:ph type="title"/>
-          </p:nvPr>
-        </p:nvSpPr>
-        <p:spPr/>
-        <p:txBody>
-          <a:bodyPr/>
-          <a:lstStyle/>
-          <a:p>
-            <a:pPr algn="ctr"/>
-            <a:r>
-              <a:rPr lang="en-US" dirty="0" err="1"/>
-              <a:t>magfield</a:t>
-            </a:r>
-            <a:endParaRPr lang="en-US" dirty="0"/>
-          </a:p>
-        </p:txBody>
-      </p:sp>
-      <p:sp>
-        <p:nvSpPr>
-          <p:cNvPr id="3" name="Content Placeholder 2"/>
-          <p:cNvSpPr>
-            <a:spLocks noGrp="1"/>
-          </p:cNvSpPr>
-          <p:nvPr>
-            <p:ph idx="1"/>
-          </p:nvPr>
-        </p:nvSpPr>
-        <p:spPr/>
-        <p:txBody>
-          <a:bodyPr/>
-          <a:lstStyle/>
-          <a:p>
-            <a:r>
-              <a:rPr lang="en-US" dirty="0"/>
-              <a:t>Draws the magnetic field based on the solenoid current</a:t>
-            </a:r>
-          </a:p>
-          <a:p>
-            <a:endParaRPr lang="en-US" dirty="0"/>
-          </a:p>
-          <a:p>
-            <a:r>
-              <a:rPr lang="en-US" dirty="0"/>
-              <a:t>NOTE: Does not use </a:t>
-            </a:r>
-            <a:r>
-              <a:rPr lang="en-US" dirty="0" err="1"/>
-              <a:t>meshgrid</a:t>
-            </a:r>
-            <a:r>
-              <a:rPr lang="en-US" dirty="0"/>
-              <a:t> </a:t>
-            </a:r>
-          </a:p>
-          <a:p>
-            <a:r>
-              <a:rPr lang="en-US" dirty="0"/>
-              <a:t>NOTE: The entire field is pointing in one direction (which may be incorrect)</a:t>
-            </a:r>
-          </a:p>
-        </p:txBody>
-      </p:sp>
-    </p:spTree>
-    <p:extLst>
-      <p:ext uri="{BB962C8B-B14F-4D97-AF65-F5344CB8AC3E}">
-        <p14:creationId xmlns:p14="http://schemas.microsoft.com/office/powerpoint/2010/main" val="2423817445"/>
-      </p:ext>
-    </p:extLst>
-  </p:cSld>
-  <p:clrMapOvr>
-    <a:masterClrMapping/>
-  </p:clrMapOvr>
-</p:sld>
-</file>
-
-<file path=ppt/slides/slide29.xml><?xml version="1.0" encoding="utf-8"?>
-<p:sld xmlns:a="http://schemas.openxmlformats.org/drawingml/2006/main" xmlns:r="http://schemas.openxmlformats.org/officeDocument/2006/relationships" xmlns:p="http://schemas.openxmlformats.org/presentationml/2006/main">
-  <p:cSld>
-    <p:spTree>
-      <p:nvGrpSpPr>
-        <p:cNvPr id="1" name=""/>
-        <p:cNvGrpSpPr/>
-        <p:nvPr/>
-      </p:nvGrpSpPr>
-      <p:grpSpPr>
-        <a:xfrm>
-          <a:off x="0" y="0"/>
-          <a:ext cx="0" cy="0"/>
-          <a:chOff x="0" y="0"/>
-          <a:chExt cx="0" cy="0"/>
-        </a:xfrm>
-      </p:grpSpPr>
-      <p:sp>
-        <p:nvSpPr>
-          <p:cNvPr id="2" name="Title 1"/>
-          <p:cNvSpPr>
-            <a:spLocks noGrp="1"/>
-          </p:cNvSpPr>
-          <p:nvPr>
-            <p:ph type="title"/>
-          </p:nvPr>
-        </p:nvSpPr>
-        <p:spPr/>
-        <p:txBody>
-          <a:bodyPr/>
-          <a:lstStyle/>
-          <a:p>
-            <a:r>
-              <a:rPr lang="en-US" dirty="0"/>
-              <a:t>DATA</a:t>
-            </a:r>
-          </a:p>
-        </p:txBody>
-      </p:sp>
-      <p:sp>
-        <p:nvSpPr>
-          <p:cNvPr id="3" name="Content Placeholder 2"/>
-          <p:cNvSpPr>
-            <a:spLocks noGrp="1"/>
-          </p:cNvSpPr>
-          <p:nvPr>
-            <p:ph idx="1"/>
-          </p:nvPr>
-        </p:nvSpPr>
-        <p:spPr/>
-        <p:txBody>
-          <a:bodyPr/>
-          <a:lstStyle/>
-          <a:p>
-            <a:r>
-              <a:rPr lang="en-US" dirty="0"/>
-              <a:t>Solenoid-current(</a:t>
-            </a:r>
-            <a:r>
-              <a:rPr lang="en-US" dirty="0" err="1"/>
-              <a:t>curra</a:t>
-            </a:r>
-            <a:r>
-              <a:rPr lang="en-US" dirty="0"/>
-              <a:t>, </a:t>
-            </a:r>
-            <a:r>
-              <a:rPr lang="en-US" dirty="0" err="1"/>
-              <a:t>currb</a:t>
-            </a:r>
-            <a:r>
-              <a:rPr lang="en-US" dirty="0"/>
-              <a:t>, </a:t>
-            </a:r>
-            <a:r>
-              <a:rPr lang="en-US" dirty="0" err="1"/>
-              <a:t>currc</a:t>
-            </a:r>
-            <a:r>
-              <a:rPr lang="en-US" dirty="0"/>
-              <a:t>)</a:t>
+              <a:t>Solenoid Current Data is put into an excel file</a:t>
             </a:r>
           </a:p>
         </p:txBody>
@@ -12279,196 +11906,6 @@
           <a:chExt cx="0" cy="0"/>
         </a:xfrm>
       </p:grpSpPr>
-      <p:grpSp>
-        <p:nvGrpSpPr>
-          <p:cNvPr id="5" name="Group 4"/>
-          <p:cNvGrpSpPr/>
-          <p:nvPr/>
-        </p:nvGrpSpPr>
-        <p:grpSpPr>
-          <a:xfrm>
-            <a:off x="1927009" y="1825623"/>
-            <a:ext cx="7983791" cy="484957"/>
-            <a:chOff x="1927009" y="1825623"/>
-            <a:chExt cx="7983791" cy="484957"/>
-          </a:xfrm>
-        </p:grpSpPr>
-        <p:sp>
-          <p:nvSpPr>
-            <p:cNvPr id="8" name="Rectangle 7"/>
-            <p:cNvSpPr/>
-            <p:nvPr/>
-          </p:nvSpPr>
-          <p:spPr>
-            <a:xfrm>
-              <a:off x="1927009" y="1825626"/>
-              <a:ext cx="806244" cy="455458"/>
-            </a:xfrm>
-            <a:prstGeom prst="rect">
-              <a:avLst/>
-            </a:prstGeom>
-          </p:spPr>
-          <p:style>
-            <a:lnRef idx="2">
-              <a:schemeClr val="accent4">
-                <a:shade val="50000"/>
-              </a:schemeClr>
-            </a:lnRef>
-            <a:fillRef idx="1">
-              <a:schemeClr val="accent4"/>
-            </a:fillRef>
-            <a:effectRef idx="0">
-              <a:schemeClr val="accent4"/>
-            </a:effectRef>
-            <a:fontRef idx="minor">
-              <a:schemeClr val="lt1"/>
-            </a:fontRef>
-          </p:style>
-          <p:txBody>
-            <a:bodyPr rtlCol="0" anchor="ctr"/>
-            <a:lstStyle/>
-            <a:p>
-              <a:pPr algn="ctr"/>
-              <a:endParaRPr lang="en-US" dirty="0"/>
-            </a:p>
-          </p:txBody>
-        </p:sp>
-        <p:grpSp>
-          <p:nvGrpSpPr>
-            <p:cNvPr id="4" name="Group 3"/>
-            <p:cNvGrpSpPr/>
-            <p:nvPr/>
-          </p:nvGrpSpPr>
-          <p:grpSpPr>
-            <a:xfrm>
-              <a:off x="2890571" y="1825623"/>
-              <a:ext cx="7020229" cy="484957"/>
-              <a:chOff x="3087331" y="1825623"/>
-              <a:chExt cx="7020229" cy="484957"/>
-            </a:xfrm>
-          </p:grpSpPr>
-          <p:sp>
-            <p:nvSpPr>
-              <p:cNvPr id="9" name="Rectangle 8"/>
-              <p:cNvSpPr/>
-              <p:nvPr/>
-            </p:nvSpPr>
-            <p:spPr>
-              <a:xfrm>
-                <a:off x="3087331" y="1825623"/>
-                <a:ext cx="3873908" cy="484957"/>
-              </a:xfrm>
-              <a:prstGeom prst="rect">
-                <a:avLst/>
-              </a:prstGeom>
-            </p:spPr>
-            <p:style>
-              <a:lnRef idx="2">
-                <a:schemeClr val="accent2">
-                  <a:shade val="50000"/>
-                </a:schemeClr>
-              </a:lnRef>
-              <a:fillRef idx="1">
-                <a:schemeClr val="accent2"/>
-              </a:fillRef>
-              <a:effectRef idx="0">
-                <a:schemeClr val="accent2"/>
-              </a:effectRef>
-              <a:fontRef idx="minor">
-                <a:schemeClr val="lt1"/>
-              </a:fontRef>
-            </p:style>
-            <p:txBody>
-              <a:bodyPr rtlCol="0" anchor="ctr"/>
-              <a:lstStyle/>
-              <a:p>
-                <a:pPr algn="ctr"/>
-                <a:endParaRPr lang="en-US"/>
-              </a:p>
-            </p:txBody>
-          </p:sp>
-          <p:sp>
-            <p:nvSpPr>
-              <p:cNvPr id="10" name="Rectangle 9"/>
-              <p:cNvSpPr/>
-              <p:nvPr/>
-            </p:nvSpPr>
-            <p:spPr>
-              <a:xfrm>
-                <a:off x="7039897" y="1825624"/>
-                <a:ext cx="855406" cy="484956"/>
-              </a:xfrm>
-              <a:prstGeom prst="rect">
-                <a:avLst/>
-              </a:prstGeom>
-            </p:spPr>
-            <p:style>
-              <a:lnRef idx="2">
-                <a:schemeClr val="accent6">
-                  <a:shade val="50000"/>
-                </a:schemeClr>
-              </a:lnRef>
-              <a:fillRef idx="1">
-                <a:schemeClr val="accent6"/>
-              </a:fillRef>
-              <a:effectRef idx="0">
-                <a:schemeClr val="accent6"/>
-              </a:effectRef>
-              <a:fontRef idx="minor">
-                <a:schemeClr val="lt1"/>
-              </a:fontRef>
-            </p:style>
-            <p:txBody>
-              <a:bodyPr rtlCol="0" anchor="ctr"/>
-              <a:lstStyle/>
-              <a:p>
-                <a:pPr algn="ctr"/>
-                <a:endParaRPr lang="en-US"/>
-              </a:p>
-            </p:txBody>
-          </p:sp>
-          <p:sp>
-            <p:nvSpPr>
-              <p:cNvPr id="11" name="Rectangle 10"/>
-              <p:cNvSpPr/>
-              <p:nvPr/>
-            </p:nvSpPr>
-            <p:spPr>
-              <a:xfrm>
-                <a:off x="7973961" y="1825623"/>
-                <a:ext cx="2133599" cy="464815"/>
-              </a:xfrm>
-              <a:prstGeom prst="rect">
-                <a:avLst/>
-              </a:prstGeom>
-            </p:spPr>
-            <p:style>
-              <a:lnRef idx="2">
-                <a:schemeClr val="accent1">
-                  <a:shade val="50000"/>
-                </a:schemeClr>
-              </a:lnRef>
-              <a:fillRef idx="1">
-                <a:schemeClr val="accent1"/>
-              </a:fillRef>
-              <a:effectRef idx="0">
-                <a:schemeClr val="accent1"/>
-              </a:effectRef>
-              <a:fontRef idx="minor">
-                <a:schemeClr val="lt1"/>
-              </a:fontRef>
-            </p:style>
-            <p:txBody>
-              <a:bodyPr rtlCol="0" anchor="ctr"/>
-              <a:lstStyle/>
-              <a:p>
-                <a:pPr algn="ctr"/>
-                <a:endParaRPr lang="en-US" dirty="0"/>
-              </a:p>
-            </p:txBody>
-          </p:sp>
-        </p:grpSp>
-      </p:grpSp>
       <p:sp>
         <p:nvSpPr>
           <p:cNvPr id="3" name="Content Placeholder 2"/>
@@ -12514,8 +11951,12 @@
               <a:t>function is the highest level function where the </a:t>
             </a:r>
             <a:r>
+              <a:rPr lang="en-US" i="1" dirty="0"/>
+              <a:t>rollBallInRectangle or </a:t>
+            </a:r>
+            <a:r>
               <a:rPr lang="en-US" i="1" dirty="0" err="1"/>
-              <a:t>rollBallInSquare</a:t>
+              <a:t>rollBallInCircle</a:t>
             </a:r>
             <a:r>
               <a:rPr lang="en-US" i="1" dirty="0"/>
@@ -12531,7 +11972,7 @@
             </a:r>
             <a:r>
               <a:rPr lang="en-US" dirty="0"/>
-              <a:t> is called, as well as functions that clear all the figures &amp; clear all the data. The main function has 10 parameters. However, it can be called with 1,6,9, or 10 arguments. </a:t>
+              <a:t> is called, as well as functions that clears all the figures &amp; data. The main function has 10 parameters. However, it can be called with 1,6,9, or 10 arguments. </a:t>
             </a:r>
           </a:p>
         </p:txBody>
@@ -12704,276 +12145,138 @@
           <a:chExt cx="0" cy="0"/>
         </a:xfrm>
       </p:grpSpPr>
-      <p:grpSp>
-        <p:nvGrpSpPr>
-          <p:cNvPr id="8" name="Group 7"/>
-          <p:cNvGrpSpPr/>
-          <p:nvPr/>
-        </p:nvGrpSpPr>
-        <p:grpSpPr>
+      <p:sp>
+        <p:nvSpPr>
+          <p:cNvPr id="3" name="Content Placeholder 2"/>
+          <p:cNvSpPr>
+            <a:spLocks noGrp="1"/>
+          </p:cNvSpPr>
+          <p:nvPr>
+            <p:ph idx="1"/>
+          </p:nvPr>
+        </p:nvSpPr>
+        <p:spPr>
           <a:xfrm>
-            <a:off x="3637125" y="1825625"/>
-            <a:ext cx="7034733" cy="476073"/>
-            <a:chOff x="3087331" y="1825623"/>
-            <a:chExt cx="7034733" cy="476073"/>
+            <a:off x="838200" y="1825625"/>
+            <a:ext cx="11473800" cy="4351338"/>
           </a:xfrm>
-        </p:grpSpPr>
-        <p:sp>
-          <p:nvSpPr>
-            <p:cNvPr id="9" name="Rectangle 8"/>
-            <p:cNvSpPr/>
-            <p:nvPr/>
-          </p:nvSpPr>
-          <p:spPr>
-            <a:xfrm>
-              <a:off x="3087331" y="1825623"/>
-              <a:ext cx="3840121" cy="425651"/>
-            </a:xfrm>
-            <a:prstGeom prst="rect">
-              <a:avLst/>
-            </a:prstGeom>
-          </p:spPr>
-          <p:style>
-            <a:lnRef idx="2">
-              <a:schemeClr val="accent2">
-                <a:shade val="50000"/>
-              </a:schemeClr>
-            </a:lnRef>
-            <a:fillRef idx="1">
-              <a:schemeClr val="accent2"/>
-            </a:fillRef>
-            <a:effectRef idx="0">
-              <a:schemeClr val="accent2"/>
-            </a:effectRef>
-            <a:fontRef idx="minor">
-              <a:schemeClr val="lt1"/>
-            </a:fontRef>
-          </p:style>
-          <p:txBody>
-            <a:bodyPr rtlCol="0" anchor="ctr"/>
-            <a:lstStyle/>
-            <a:p>
-              <a:pPr algn="ctr"/>
-              <a:endParaRPr lang="en-US"/>
-            </a:p>
-          </p:txBody>
-        </p:sp>
-        <p:sp>
-          <p:nvSpPr>
-            <p:cNvPr id="10" name="Rectangle 9"/>
-            <p:cNvSpPr/>
-            <p:nvPr/>
-          </p:nvSpPr>
-          <p:spPr>
-            <a:xfrm>
-              <a:off x="7039897" y="1825624"/>
-              <a:ext cx="877190" cy="443012"/>
-            </a:xfrm>
-            <a:prstGeom prst="rect">
-              <a:avLst/>
-            </a:prstGeom>
-          </p:spPr>
-          <p:style>
-            <a:lnRef idx="2">
-              <a:schemeClr val="accent6">
-                <a:shade val="50000"/>
-              </a:schemeClr>
-            </a:lnRef>
-            <a:fillRef idx="1">
-              <a:schemeClr val="accent6"/>
-            </a:fillRef>
-            <a:effectRef idx="0">
-              <a:schemeClr val="accent6"/>
-            </a:effectRef>
-            <a:fontRef idx="minor">
-              <a:schemeClr val="lt1"/>
-            </a:fontRef>
-          </p:style>
-          <p:txBody>
-            <a:bodyPr rtlCol="0" anchor="ctr"/>
-            <a:lstStyle/>
-            <a:p>
-              <a:pPr algn="ctr"/>
-              <a:endParaRPr lang="en-US"/>
-            </a:p>
-          </p:txBody>
-        </p:sp>
-        <p:sp>
-          <p:nvSpPr>
-            <p:cNvPr id="11" name="Rectangle 10"/>
-            <p:cNvSpPr/>
-            <p:nvPr/>
-          </p:nvSpPr>
-          <p:spPr>
-            <a:xfrm>
-              <a:off x="7993625" y="1825624"/>
-              <a:ext cx="2128439" cy="476072"/>
-            </a:xfrm>
-            <a:prstGeom prst="rect">
-              <a:avLst/>
-            </a:prstGeom>
-          </p:spPr>
-          <p:style>
-            <a:lnRef idx="2">
-              <a:schemeClr val="accent1">
-                <a:shade val="50000"/>
-              </a:schemeClr>
-            </a:lnRef>
-            <a:fillRef idx="1">
-              <a:schemeClr val="accent1"/>
-            </a:fillRef>
-            <a:effectRef idx="0">
-              <a:schemeClr val="accent1"/>
-            </a:effectRef>
-            <a:fontRef idx="minor">
-              <a:schemeClr val="lt1"/>
-            </a:fontRef>
-          </p:style>
-          <p:txBody>
-            <a:bodyPr rtlCol="0" anchor="ctr"/>
-            <a:lstStyle/>
-            <a:p>
-              <a:pPr algn="ctr"/>
-              <a:endParaRPr lang="en-US"/>
-            </a:p>
-          </p:txBody>
-        </p:sp>
-      </p:grpSp>
-      <p:grpSp>
-        <p:nvGrpSpPr>
-          <p:cNvPr id="13" name="Group 12"/>
-          <p:cNvGrpSpPr/>
-          <p:nvPr/>
-        </p:nvGrpSpPr>
-        <p:grpSpPr>
-          <a:xfrm>
-            <a:off x="3413347" y="2879647"/>
-            <a:ext cx="7015443" cy="514455"/>
-            <a:chOff x="3087331" y="1825623"/>
-            <a:chExt cx="7015443" cy="514455"/>
-          </a:xfrm>
-        </p:grpSpPr>
-        <p:sp>
-          <p:nvSpPr>
-            <p:cNvPr id="14" name="Rectangle 13"/>
-            <p:cNvSpPr/>
-            <p:nvPr/>
-          </p:nvSpPr>
-          <p:spPr>
-            <a:xfrm>
-              <a:off x="3087331" y="1825623"/>
-              <a:ext cx="3873908" cy="484957"/>
-            </a:xfrm>
-            <a:prstGeom prst="rect">
-              <a:avLst/>
-            </a:prstGeom>
-          </p:spPr>
-          <p:style>
-            <a:lnRef idx="2">
-              <a:schemeClr val="accent2">
-                <a:shade val="50000"/>
-              </a:schemeClr>
-            </a:lnRef>
-            <a:fillRef idx="1">
-              <a:schemeClr val="accent2"/>
-            </a:fillRef>
-            <a:effectRef idx="0">
-              <a:schemeClr val="accent2"/>
-            </a:effectRef>
-            <a:fontRef idx="minor">
-              <a:schemeClr val="lt1"/>
-            </a:fontRef>
-          </p:style>
-          <p:txBody>
-            <a:bodyPr rtlCol="0" anchor="ctr"/>
-            <a:lstStyle/>
-            <a:p>
-              <a:pPr algn="ctr"/>
-              <a:endParaRPr lang="en-US"/>
-            </a:p>
-          </p:txBody>
-        </p:sp>
-        <p:sp>
-          <p:nvSpPr>
-            <p:cNvPr id="15" name="Rectangle 14"/>
-            <p:cNvSpPr/>
-            <p:nvPr/>
-          </p:nvSpPr>
-          <p:spPr>
-            <a:xfrm>
-              <a:off x="7039897" y="1825624"/>
-              <a:ext cx="846325" cy="514454"/>
-            </a:xfrm>
-            <a:prstGeom prst="rect">
-              <a:avLst/>
-            </a:prstGeom>
-          </p:spPr>
-          <p:style>
-            <a:lnRef idx="2">
-              <a:schemeClr val="accent6">
-                <a:shade val="50000"/>
-              </a:schemeClr>
-            </a:lnRef>
-            <a:fillRef idx="1">
-              <a:schemeClr val="accent6"/>
-            </a:fillRef>
-            <a:effectRef idx="0">
-              <a:schemeClr val="accent6"/>
-            </a:effectRef>
-            <a:fontRef idx="minor">
-              <a:schemeClr val="lt1"/>
-            </a:fontRef>
-          </p:style>
-          <p:txBody>
-            <a:bodyPr rtlCol="0" anchor="ctr"/>
-            <a:lstStyle/>
-            <a:p>
-              <a:pPr algn="ctr"/>
-              <a:endParaRPr lang="en-US"/>
-            </a:p>
-          </p:txBody>
-        </p:sp>
-        <p:sp>
-          <p:nvSpPr>
-            <p:cNvPr id="16" name="Rectangle 15"/>
-            <p:cNvSpPr/>
-            <p:nvPr/>
-          </p:nvSpPr>
-          <p:spPr>
-            <a:xfrm>
-              <a:off x="7993625" y="1825624"/>
-              <a:ext cx="2109149" cy="484956"/>
-            </a:xfrm>
-            <a:prstGeom prst="rect">
-              <a:avLst/>
-            </a:prstGeom>
-          </p:spPr>
-          <p:style>
-            <a:lnRef idx="2">
-              <a:schemeClr val="accent1">
-                <a:shade val="50000"/>
-              </a:schemeClr>
-            </a:lnRef>
-            <a:fillRef idx="1">
-              <a:schemeClr val="accent1"/>
-            </a:fillRef>
-            <a:effectRef idx="0">
-              <a:schemeClr val="accent1"/>
-            </a:effectRef>
-            <a:fontRef idx="minor">
-              <a:schemeClr val="lt1"/>
-            </a:fontRef>
-          </p:style>
-          <p:txBody>
-            <a:bodyPr rtlCol="0" anchor="ctr"/>
-            <a:lstStyle/>
-            <a:p>
-              <a:pPr algn="ctr"/>
-              <a:endParaRPr lang="en-US"/>
-            </a:p>
-          </p:txBody>
-        </p:sp>
-      </p:grpSp>
+        </p:spPr>
+        <p:txBody>
+          <a:bodyPr/>
+          <a:lstStyle/>
+          <a:p>
+            <a:r>
+              <a:rPr lang="en-US" dirty="0">
+                <a:hlinkClick r:id="rId2" action="ppaction://hlinksldjump"/>
+              </a:rPr>
+              <a:t>rollBallInRectangle</a:t>
+            </a:r>
+            <a:r>
+              <a:rPr lang="en-US" dirty="0"/>
+              <a:t> (  x0, y0, phi, psi, </a:t>
+            </a:r>
+            <a:r>
+              <a:rPr lang="en-US" dirty="0" err="1"/>
+              <a:t>ShapeSize</a:t>
+            </a:r>
+            <a:r>
+              <a:rPr lang="en-US" dirty="0"/>
+              <a:t>, T, </a:t>
+            </a:r>
+            <a:r>
+              <a:rPr lang="en-US" dirty="0" err="1"/>
+              <a:t>dt</a:t>
+            </a:r>
+            <a:r>
+              <a:rPr lang="en-US" dirty="0"/>
+              <a:t>, speed, </a:t>
+            </a:r>
+            <a:r>
+              <a:rPr lang="en-US" dirty="0" err="1"/>
+              <a:t>ballsize</a:t>
+            </a:r>
+            <a:r>
+              <a:rPr lang="en-US" dirty="0"/>
+              <a:t>)</a:t>
+            </a:r>
+          </a:p>
+          <a:p>
+            <a:endParaRPr lang="en-US" dirty="0"/>
+          </a:p>
+          <a:p>
+            <a:r>
+              <a:rPr lang="en-US" dirty="0" err="1">
+                <a:hlinkClick r:id="rId3" action="ppaction://hlinksldjump"/>
+              </a:rPr>
+              <a:t>rollBallInCirlce</a:t>
+            </a:r>
+            <a:r>
+              <a:rPr lang="en-US" dirty="0"/>
+              <a:t> (  x0, y0, phi, psi, </a:t>
+            </a:r>
+            <a:r>
+              <a:rPr lang="en-US" dirty="0" err="1"/>
+              <a:t>ShapeSize</a:t>
+            </a:r>
+            <a:r>
+              <a:rPr lang="en-US" dirty="0"/>
+              <a:t>,  T, </a:t>
+            </a:r>
+            <a:r>
+              <a:rPr lang="en-US" dirty="0" err="1"/>
+              <a:t>dt</a:t>
+            </a:r>
+            <a:r>
+              <a:rPr lang="en-US" dirty="0"/>
+              <a:t>, speed, </a:t>
+            </a:r>
+            <a:r>
+              <a:rPr lang="en-US" dirty="0" err="1"/>
+              <a:t>ballsize</a:t>
+            </a:r>
+            <a:r>
+              <a:rPr lang="en-US" dirty="0"/>
+              <a:t> )</a:t>
+            </a:r>
+          </a:p>
+          <a:p>
+            <a:endParaRPr lang="en-US" dirty="0">
+              <a:hlinkClick r:id="rId3" action="ppaction://hlinksldjump"/>
+            </a:endParaRPr>
+          </a:p>
+          <a:p>
+            <a:r>
+              <a:rPr lang="en-US" dirty="0">
+                <a:hlinkClick r:id="rId4" action="ppaction://hlinksldjump"/>
+              </a:rPr>
+              <a:t>Playback</a:t>
+            </a:r>
+            <a:r>
+              <a:rPr lang="en-US" dirty="0"/>
+              <a:t> ( </a:t>
+            </a:r>
+            <a:r>
+              <a:rPr lang="en-US" dirty="0" err="1"/>
+              <a:t>currx</a:t>
+            </a:r>
+            <a:r>
+              <a:rPr lang="en-US" dirty="0"/>
+              <a:t>, curry, </a:t>
+            </a:r>
+            <a:r>
+              <a:rPr lang="en-US" dirty="0" err="1"/>
+              <a:t>currz,wHb</a:t>
+            </a:r>
+            <a:r>
+              <a:rPr lang="en-US" dirty="0"/>
+              <a:t> )</a:t>
+            </a:r>
+          </a:p>
+          <a:p>
+            <a:endParaRPr lang="en-US" dirty="0"/>
+          </a:p>
+        </p:txBody>
+      </p:sp>
       <p:sp>
         <p:nvSpPr>
           <p:cNvPr id="2" name="Title 1"/>
@@ -13040,7 +12343,7 @@
                 <a:solidFill>
                   <a:schemeClr val="tx1"/>
                 </a:solidFill>
-                <a:hlinkClick r:id="rId2" action="ppaction://hlinksldjump"/>
+                <a:hlinkClick r:id="rId5" action="ppaction://hlinksldjump"/>
               </a:rPr>
               <a:t>MAP</a:t>
             </a:r>
@@ -13096,7 +12399,7 @@
                 <a:solidFill>
                   <a:schemeClr val="tx1"/>
                 </a:solidFill>
-                <a:hlinkClick r:id="rId3" action="ppaction://hlinksldjump"/>
+                <a:hlinkClick r:id="rId6" action="ppaction://hlinksldjump"/>
               </a:rPr>
               <a:t>CNTRL</a:t>
             </a:r>
@@ -13105,177 +12408,6 @@
                 <a:schemeClr val="tx1"/>
               </a:solidFill>
             </a:endParaRPr>
-          </a:p>
-        </p:txBody>
-      </p:sp>
-      <p:sp>
-        <p:nvSpPr>
-          <p:cNvPr id="3" name="Content Placeholder 2"/>
-          <p:cNvSpPr>
-            <a:spLocks noGrp="1"/>
-          </p:cNvSpPr>
-          <p:nvPr>
-            <p:ph idx="1"/>
-          </p:nvPr>
-        </p:nvSpPr>
-        <p:spPr/>
-        <p:txBody>
-          <a:bodyPr/>
-          <a:lstStyle/>
-          <a:p>
-            <a:r>
-              <a:rPr lang="en-US" dirty="0" err="1">
-                <a:hlinkClick r:id="rId4" action="ppaction://hlinksldjump"/>
-              </a:rPr>
-              <a:t>rollBallInSquare</a:t>
-            </a:r>
-            <a:r>
-              <a:rPr lang="en-US" dirty="0"/>
-              <a:t> (  x0, y0, phi, psi, </a:t>
-            </a:r>
-            <a:r>
-              <a:rPr lang="en-US" dirty="0" err="1"/>
-              <a:t>ShapeSize</a:t>
-            </a:r>
-            <a:r>
-              <a:rPr lang="en-US" dirty="0"/>
-              <a:t>,   </a:t>
-            </a:r>
-            <a:r>
-              <a:rPr lang="en-US" dirty="0">
-                <a:hlinkClick r:id="rId5" action="ppaction://hlinksldjump"/>
-              </a:rPr>
-              <a:t>T, </a:t>
-            </a:r>
-            <a:r>
-              <a:rPr lang="en-US" dirty="0" err="1">
-                <a:hlinkClick r:id="rId5" action="ppaction://hlinksldjump"/>
-              </a:rPr>
-              <a:t>dt</a:t>
-            </a:r>
-            <a:r>
-              <a:rPr lang="en-US" dirty="0">
-                <a:hlinkClick r:id="rId5" action="ppaction://hlinksldjump"/>
-              </a:rPr>
-              <a:t>,</a:t>
-            </a:r>
-            <a:r>
-              <a:rPr lang="en-US" dirty="0"/>
-              <a:t>  </a:t>
-            </a:r>
-            <a:r>
-              <a:rPr lang="en-US" dirty="0">
-                <a:hlinkClick r:id="rId3" action="ppaction://hlinksldjump"/>
-              </a:rPr>
-              <a:t>speed, </a:t>
-            </a:r>
-            <a:r>
-              <a:rPr lang="en-US" dirty="0" err="1">
-                <a:hlinkClick r:id="rId3" action="ppaction://hlinksldjump"/>
-              </a:rPr>
-              <a:t>ballsize</a:t>
-            </a:r>
-            <a:r>
-              <a:rPr lang="en-US" dirty="0"/>
-              <a:t> )</a:t>
-            </a:r>
-          </a:p>
-          <a:p>
-            <a:endParaRPr lang="en-US" dirty="0"/>
-          </a:p>
-          <a:p>
-            <a:r>
-              <a:rPr lang="en-US" dirty="0" err="1">
-                <a:hlinkClick r:id="rId5" action="ppaction://hlinksldjump"/>
-              </a:rPr>
-              <a:t>rollBallInCirlce</a:t>
-            </a:r>
-            <a:r>
-              <a:rPr lang="en-US" dirty="0"/>
-              <a:t> (  x0, y0, phi, psi, </a:t>
-            </a:r>
-            <a:r>
-              <a:rPr lang="en-US" dirty="0" err="1"/>
-              <a:t>ShapeSize</a:t>
-            </a:r>
-            <a:r>
-              <a:rPr lang="en-US" dirty="0"/>
-              <a:t>,  </a:t>
-            </a:r>
-            <a:r>
-              <a:rPr lang="en-US" dirty="0">
-                <a:hlinkClick r:id="rId5" action="ppaction://hlinksldjump"/>
-              </a:rPr>
-              <a:t>T, </a:t>
-            </a:r>
-            <a:r>
-              <a:rPr lang="en-US" dirty="0" err="1">
-                <a:hlinkClick r:id="rId5" action="ppaction://hlinksldjump"/>
-              </a:rPr>
-              <a:t>dt</a:t>
-            </a:r>
-            <a:r>
-              <a:rPr lang="en-US" dirty="0">
-                <a:hlinkClick r:id="rId5" action="ppaction://hlinksldjump"/>
-              </a:rPr>
-              <a:t>,</a:t>
-            </a:r>
-            <a:r>
-              <a:rPr lang="en-US" dirty="0"/>
-              <a:t>   </a:t>
-            </a:r>
-            <a:r>
-              <a:rPr lang="en-US" dirty="0">
-                <a:hlinkClick r:id="rId3" action="ppaction://hlinksldjump"/>
-              </a:rPr>
-              <a:t>speed, </a:t>
-            </a:r>
-            <a:r>
-              <a:rPr lang="en-US" dirty="0" err="1">
-                <a:hlinkClick r:id="rId3" action="ppaction://hlinksldjump"/>
-              </a:rPr>
-              <a:t>ballsize</a:t>
-            </a:r>
-            <a:r>
-              <a:rPr lang="en-US" dirty="0"/>
-              <a:t>)</a:t>
-            </a:r>
-          </a:p>
-          <a:p>
-            <a:endParaRPr lang="en-US" dirty="0">
-              <a:hlinkClick r:id="rId5" action="ppaction://hlinksldjump"/>
-            </a:endParaRPr>
-          </a:p>
-          <a:p>
-            <a:r>
-              <a:rPr lang="en-US" dirty="0">
-                <a:hlinkClick r:id="rId6" action="ppaction://hlinksldjump"/>
-              </a:rPr>
-              <a:t>Playback</a:t>
-            </a:r>
-            <a:r>
-              <a:rPr lang="en-US" dirty="0"/>
-              <a:t> (</a:t>
-            </a:r>
-            <a:r>
-              <a:rPr lang="en-US" dirty="0" err="1"/>
-              <a:t>currx</a:t>
-            </a:r>
-            <a:r>
-              <a:rPr lang="en-US" dirty="0"/>
-              <a:t>, curry, </a:t>
-            </a:r>
-            <a:r>
-              <a:rPr lang="en-US" dirty="0" err="1"/>
-              <a:t>currz,wHb</a:t>
-            </a:r>
-            <a:r>
-              <a:rPr lang="en-US" dirty="0"/>
-              <a:t>)</a:t>
-            </a:r>
-          </a:p>
-          <a:p>
-            <a:endParaRPr lang="en-US" dirty="0"/>
           </a:p>
         </p:txBody>
       </p:sp>
@@ -13327,13 +12459,13 @@
             <a:pPr algn="ctr"/>
             <a:r>
               <a:rPr lang="en-US" dirty="0"/>
-              <a:t>rollBallInSquare</a:t>
+              <a:t>rollBallInRectangle</a:t>
             </a:r>
           </a:p>
         </p:txBody>
       </p:sp>
-      <mc:AlternateContent xmlns:mc="http://schemas.openxmlformats.org/markup-compatibility/2006" xmlns:a14="http://schemas.microsoft.com/office/drawing/2010/main">
-        <mc:Choice Requires="a14">
+      <mc:AlternateContent xmlns:mc="http://schemas.openxmlformats.org/markup-compatibility/2006">
+        <mc:Choice xmlns:a14="http://schemas.microsoft.com/office/drawing/2010/main" Requires="a14">
           <p:sp>
             <p:nvSpPr>
               <p:cNvPr id="3" name="Content Placeholder 2"/>
@@ -13347,12 +12479,12 @@
             <p:spPr>
               <a:xfrm>
                 <a:off x="838200" y="1825624"/>
-                <a:ext cx="10515600" cy="4437523"/>
+                <a:ext cx="6273203" cy="4437523"/>
               </a:xfrm>
             </p:spPr>
             <p:txBody>
               <a:bodyPr>
-                <a:normAutofit fontScale="62500" lnSpcReduction="20000"/>
+                <a:normAutofit fontScale="70000" lnSpcReduction="20000"/>
               </a:bodyPr>
               <a:lstStyle/>
               <a:p>
@@ -13477,12 +12609,7 @@
                   <a:rPr lang="en-US" b="1" dirty="0"/>
                   <a:t>Output</a:t>
                 </a:r>
-              </a:p>
-              <a:p>
-                <a:r>
-                  <a:rPr lang="en-US" dirty="0"/>
-                  <a:t>Solenoid-currents concatenated and output (OLD)</a:t>
-                </a:r>
+                <a:endParaRPr lang="en-US" dirty="0"/>
               </a:p>
               <a:p>
                 <a:r>
@@ -13493,7 +12620,7 @@
             </p:txBody>
           </p:sp>
         </mc:Choice>
-        <mc:Fallback xmlns="">
+        <mc:Fallback>
           <p:sp>
             <p:nvSpPr>
               <p:cNvPr id="3" name="Content Placeholder 2"/>
@@ -13507,12 +12634,12 @@
             <p:spPr>
               <a:xfrm>
                 <a:off x="838200" y="1825624"/>
-                <a:ext cx="10515600" cy="4437523"/>
+                <a:ext cx="6273203" cy="4437523"/>
               </a:xfrm>
               <a:blipFill>
                 <a:blip r:embed="rId2"/>
                 <a:stretch>
-                  <a:fillRect l="-522" t="-2198" b="-2335"/>
+                  <a:fillRect l="-1069" t="-2473" b="-1648"/>
                 </a:stretch>
               </a:blipFill>
             </p:spPr>
@@ -15802,6 +14929,161 @@
       </p:grpSpPr>
       <p:sp>
         <p:nvSpPr>
+          <p:cNvPr id="3" name="Content Placeholder 2"/>
+          <p:cNvSpPr>
+            <a:spLocks noGrp="1"/>
+          </p:cNvSpPr>
+          <p:nvPr>
+            <p:ph idx="1"/>
+          </p:nvPr>
+        </p:nvSpPr>
+        <p:spPr>
+          <a:xfrm>
+            <a:off x="838200" y="1832825"/>
+            <a:ext cx="10515600" cy="4351338"/>
+          </a:xfrm>
+        </p:spPr>
+        <p:txBody>
+          <a:bodyPr/>
+          <a:lstStyle/>
+          <a:p>
+            <a:r>
+              <a:rPr lang="en-US" dirty="0" err="1">
+                <a:hlinkClick r:id="rId2" action="ppaction://hlinksldjump"/>
+              </a:rPr>
+              <a:t>Ballfwd</a:t>
+            </a:r>
+            <a:r>
+              <a:rPr lang="en-US" dirty="0"/>
+              <a:t> ( p0, pf, </a:t>
+            </a:r>
+            <a:r>
+              <a:rPr lang="en-US" dirty="0" err="1"/>
+              <a:t>wHb</a:t>
+            </a:r>
+            <a:r>
+              <a:rPr lang="en-US" dirty="0"/>
+              <a:t>, T, </a:t>
+            </a:r>
+            <a:r>
+              <a:rPr lang="en-US" dirty="0" err="1"/>
+              <a:t>dt</a:t>
+            </a:r>
+            <a:r>
+              <a:rPr lang="en-US" dirty="0"/>
+              <a:t>, speed, </a:t>
+            </a:r>
+            <a:r>
+              <a:rPr lang="en-US" dirty="0" err="1"/>
+              <a:t>ballsize</a:t>
+            </a:r>
+            <a:r>
+              <a:rPr lang="en-US" dirty="0"/>
+              <a:t> )</a:t>
+            </a:r>
+          </a:p>
+          <a:p>
+            <a:endParaRPr lang="en-US" dirty="0">
+              <a:hlinkClick r:id="rId3" action="ppaction://hlinksldjump"/>
+            </a:endParaRPr>
+          </a:p>
+          <a:p>
+            <a:r>
+              <a:rPr lang="en-US" dirty="0" err="1">
+                <a:hlinkClick r:id="rId3" action="ppaction://hlinksldjump"/>
+              </a:rPr>
+              <a:t>Fwdcurrent</a:t>
+            </a:r>
+            <a:r>
+              <a:rPr lang="en-US" dirty="0"/>
+              <a:t> (  I0, If, </a:t>
+            </a:r>
+            <a:r>
+              <a:rPr lang="en-US" dirty="0" err="1"/>
+              <a:t>wHb</a:t>
+            </a:r>
+            <a:r>
+              <a:rPr lang="en-US" dirty="0"/>
+              <a:t>, T, </a:t>
+            </a:r>
+            <a:r>
+              <a:rPr lang="en-US" dirty="0" err="1"/>
+              <a:t>dt</a:t>
+            </a:r>
+            <a:r>
+              <a:rPr lang="en-US" dirty="0"/>
+              <a:t>, speed, </a:t>
+            </a:r>
+            <a:r>
+              <a:rPr lang="en-US" dirty="0" err="1"/>
+              <a:t>ballsize</a:t>
+            </a:r>
+            <a:r>
+              <a:rPr lang="en-US" dirty="0"/>
+              <a:t>  )</a:t>
+            </a:r>
+          </a:p>
+          <a:p>
+            <a:endParaRPr lang="en-US" dirty="0">
+              <a:hlinkClick r:id="rId4" action="ppaction://hlinksldjump"/>
+            </a:endParaRPr>
+          </a:p>
+          <a:p>
+            <a:r>
+              <a:rPr lang="en-US" dirty="0" err="1">
+                <a:hlinkClick r:id="rId4" action="ppaction://hlinksldjump"/>
+              </a:rPr>
+              <a:t>fwdMagneticField</a:t>
+            </a:r>
+            <a:r>
+              <a:rPr lang="en-US" dirty="0"/>
+              <a:t> (  </a:t>
+            </a:r>
+            <a:r>
+              <a:rPr lang="es-ES" dirty="0" err="1"/>
+              <a:t>currx</a:t>
+            </a:r>
+            <a:r>
+              <a:rPr lang="es-ES" dirty="0"/>
+              <a:t>, curry, </a:t>
+            </a:r>
+            <a:r>
+              <a:rPr lang="es-ES" dirty="0" err="1"/>
+              <a:t>currz</a:t>
+            </a:r>
+            <a:r>
+              <a:rPr lang="es-ES" dirty="0"/>
+              <a:t>, x, y  </a:t>
+            </a:r>
+            <a:r>
+              <a:rPr lang="en-US" dirty="0"/>
+              <a:t>)</a:t>
+            </a:r>
+          </a:p>
+          <a:p>
+            <a:endParaRPr lang="en-US" dirty="0">
+              <a:hlinkClick r:id="rId5" action="ppaction://hlinksldjump"/>
+            </a:endParaRPr>
+          </a:p>
+          <a:p>
+            <a:r>
+              <a:rPr lang="en-US" dirty="0" err="1">
+                <a:hlinkClick r:id="rId5" action="ppaction://hlinksldjump"/>
+              </a:rPr>
+              <a:t>inverseMagneticField</a:t>
+            </a:r>
+            <a:r>
+              <a:rPr lang="en-US" dirty="0"/>
+              <a:t> (  x, y, phi, psi  )</a:t>
+            </a:r>
+          </a:p>
+          <a:p>
+            <a:endParaRPr lang="en-US" dirty="0"/>
+          </a:p>
+        </p:txBody>
+      </p:sp>
+      <p:sp>
+        <p:nvSpPr>
           <p:cNvPr id="2" name="Title 1"/>
           <p:cNvSpPr>
             <a:spLocks noGrp="1"/>
@@ -15866,7 +15148,7 @@
                 <a:solidFill>
                   <a:schemeClr val="tx1"/>
                 </a:solidFill>
-                <a:hlinkClick r:id="rId2" action="ppaction://hlinksldjump"/>
+                <a:hlinkClick r:id="rId6" action="ppaction://hlinksldjump"/>
               </a:rPr>
               <a:t>MAP</a:t>
             </a:r>
@@ -15922,7 +15204,7 @@
                 <a:solidFill>
                   <a:schemeClr val="tx1"/>
                 </a:solidFill>
-                <a:hlinkClick r:id="rId3" action="ppaction://hlinksldjump"/>
+                <a:hlinkClick r:id="rId7" action="ppaction://hlinksldjump"/>
               </a:rPr>
               <a:t>MATH</a:t>
             </a:r>
@@ -15931,324 +15213,6 @@
                 <a:schemeClr val="tx1"/>
               </a:solidFill>
             </a:endParaRPr>
-          </a:p>
-        </p:txBody>
-      </p:sp>
-      <p:sp>
-        <p:nvSpPr>
-          <p:cNvPr id="16" name="Rectangle 15"/>
-          <p:cNvSpPr/>
-          <p:nvPr/>
-        </p:nvSpPr>
-        <p:spPr>
-          <a:xfrm>
-            <a:off x="2448000" y="1825625"/>
-            <a:ext cx="4809600" cy="514454"/>
-          </a:xfrm>
-          <a:prstGeom prst="rect">
-            <a:avLst/>
-          </a:prstGeom>
-        </p:spPr>
-        <p:style>
-          <a:lnRef idx="2">
-            <a:schemeClr val="accent2">
-              <a:shade val="50000"/>
-            </a:schemeClr>
-          </a:lnRef>
-          <a:fillRef idx="1">
-            <a:schemeClr val="accent2"/>
-          </a:fillRef>
-          <a:effectRef idx="0">
-            <a:schemeClr val="accent2"/>
-          </a:effectRef>
-          <a:fontRef idx="minor">
-            <a:schemeClr val="lt1"/>
-          </a:fontRef>
-        </p:style>
-        <p:txBody>
-          <a:bodyPr rtlCol="0" anchor="ctr"/>
-          <a:lstStyle/>
-          <a:p>
-            <a:pPr algn="ctr"/>
-            <a:endParaRPr lang="en-US"/>
-          </a:p>
-        </p:txBody>
-      </p:sp>
-      <p:sp>
-        <p:nvSpPr>
-          <p:cNvPr id="19" name="Rectangle 18"/>
-          <p:cNvSpPr/>
-          <p:nvPr/>
-        </p:nvSpPr>
-        <p:spPr>
-          <a:xfrm>
-            <a:off x="3182400" y="2852198"/>
-            <a:ext cx="4629600" cy="514454"/>
-          </a:xfrm>
-          <a:prstGeom prst="rect">
-            <a:avLst/>
-          </a:prstGeom>
-        </p:spPr>
-        <p:style>
-          <a:lnRef idx="2">
-            <a:schemeClr val="accent4">
-              <a:shade val="50000"/>
-            </a:schemeClr>
-          </a:lnRef>
-          <a:fillRef idx="1">
-            <a:schemeClr val="accent4"/>
-          </a:fillRef>
-          <a:effectRef idx="0">
-            <a:schemeClr val="accent4"/>
-          </a:effectRef>
-          <a:fontRef idx="minor">
-            <a:schemeClr val="lt1"/>
-          </a:fontRef>
-        </p:style>
-        <p:txBody>
-          <a:bodyPr rtlCol="0" anchor="ctr"/>
-          <a:lstStyle/>
-          <a:p>
-            <a:pPr algn="ctr"/>
-            <a:endParaRPr lang="en-US" dirty="0"/>
-          </a:p>
-        </p:txBody>
-      </p:sp>
-      <p:sp>
-        <p:nvSpPr>
-          <p:cNvPr id="21" name="Rectangle 20"/>
-          <p:cNvSpPr/>
-          <p:nvPr/>
-        </p:nvSpPr>
-        <p:spPr>
-          <a:xfrm>
-            <a:off x="4039200" y="3878771"/>
-            <a:ext cx="3283200" cy="514454"/>
-          </a:xfrm>
-          <a:prstGeom prst="rect">
-            <a:avLst/>
-          </a:prstGeom>
-        </p:spPr>
-        <p:style>
-          <a:lnRef idx="2">
-            <a:schemeClr val="accent6">
-              <a:shade val="50000"/>
-            </a:schemeClr>
-          </a:lnRef>
-          <a:fillRef idx="1">
-            <a:schemeClr val="accent6"/>
-          </a:fillRef>
-          <a:effectRef idx="0">
-            <a:schemeClr val="accent6"/>
-          </a:effectRef>
-          <a:fontRef idx="minor">
-            <a:schemeClr val="lt1"/>
-          </a:fontRef>
-        </p:style>
-        <p:txBody>
-          <a:bodyPr rtlCol="0" anchor="ctr"/>
-          <a:lstStyle/>
-          <a:p>
-            <a:pPr algn="ctr"/>
-            <a:endParaRPr lang="en-US" dirty="0"/>
-          </a:p>
-        </p:txBody>
-      </p:sp>
-      <p:sp>
-        <p:nvSpPr>
-          <p:cNvPr id="24" name="Rectangle 23"/>
-          <p:cNvSpPr/>
-          <p:nvPr/>
-        </p:nvSpPr>
-        <p:spPr>
-          <a:xfrm>
-            <a:off x="4536000" y="4905344"/>
-            <a:ext cx="1828800" cy="514454"/>
-          </a:xfrm>
-          <a:prstGeom prst="rect">
-            <a:avLst/>
-          </a:prstGeom>
-          <a:solidFill>
-            <a:schemeClr val="accent1"/>
-          </a:solidFill>
-        </p:spPr>
-        <p:style>
-          <a:lnRef idx="2">
-            <a:schemeClr val="accent6">
-              <a:shade val="50000"/>
-            </a:schemeClr>
-          </a:lnRef>
-          <a:fillRef idx="1">
-            <a:schemeClr val="accent6"/>
-          </a:fillRef>
-          <a:effectRef idx="0">
-            <a:schemeClr val="accent6"/>
-          </a:effectRef>
-          <a:fontRef idx="minor">
-            <a:schemeClr val="lt1"/>
-          </a:fontRef>
-        </p:style>
-        <p:txBody>
-          <a:bodyPr rtlCol="0" anchor="ctr"/>
-          <a:lstStyle/>
-          <a:p>
-            <a:pPr algn="ctr"/>
-            <a:endParaRPr lang="en-US" dirty="0"/>
-          </a:p>
-        </p:txBody>
-      </p:sp>
-      <p:sp>
-        <p:nvSpPr>
-          <p:cNvPr id="3" name="Content Placeholder 2"/>
-          <p:cNvSpPr>
-            <a:spLocks noGrp="1"/>
-          </p:cNvSpPr>
-          <p:nvPr>
-            <p:ph idx="1"/>
-          </p:nvPr>
-        </p:nvSpPr>
-        <p:spPr>
-          <a:xfrm>
-            <a:off x="838200" y="1832825"/>
-            <a:ext cx="10515600" cy="4351338"/>
-          </a:xfrm>
-        </p:spPr>
-        <p:txBody>
-          <a:bodyPr/>
-          <a:lstStyle/>
-          <a:p>
-            <a:r>
-              <a:rPr lang="en-US" dirty="0" err="1">
-                <a:hlinkClick r:id="rId4" action="ppaction://hlinksldjump"/>
-              </a:rPr>
-              <a:t>Ballfwd</a:t>
-            </a:r>
-            <a:r>
-              <a:rPr lang="en-US" dirty="0"/>
-              <a:t> ( p0, pf, </a:t>
-            </a:r>
-            <a:r>
-              <a:rPr lang="en-US" dirty="0" err="1"/>
-              <a:t>wHb</a:t>
-            </a:r>
-            <a:r>
-              <a:rPr lang="en-US" dirty="0"/>
-              <a:t>, T, </a:t>
-            </a:r>
-            <a:r>
-              <a:rPr lang="en-US" dirty="0" err="1"/>
-              <a:t>dt</a:t>
-            </a:r>
-            <a:r>
-              <a:rPr lang="en-US" dirty="0"/>
-              <a:t>, speed, </a:t>
-            </a:r>
-            <a:r>
-              <a:rPr lang="en-US" dirty="0" err="1"/>
-              <a:t>ballsize</a:t>
-            </a:r>
-            <a:r>
-              <a:rPr lang="en-US" dirty="0"/>
-              <a:t> )</a:t>
-            </a:r>
-          </a:p>
-          <a:p>
-            <a:endParaRPr lang="en-US" dirty="0">
-              <a:hlinkClick r:id="rId5" action="ppaction://hlinksldjump"/>
-            </a:endParaRPr>
-          </a:p>
-          <a:p>
-            <a:r>
-              <a:rPr lang="en-US" dirty="0" err="1">
-                <a:hlinkClick r:id="rId5" action="ppaction://hlinksldjump"/>
-              </a:rPr>
-              <a:t>Fwdcurrent</a:t>
-            </a:r>
-            <a:r>
-              <a:rPr lang="en-US" dirty="0"/>
-              <a:t> (  I0, If, </a:t>
-            </a:r>
-            <a:r>
-              <a:rPr lang="en-US" dirty="0" err="1"/>
-              <a:t>wHb</a:t>
-            </a:r>
-            <a:r>
-              <a:rPr lang="en-US" dirty="0"/>
-              <a:t>, T, </a:t>
-            </a:r>
-            <a:r>
-              <a:rPr lang="en-US" dirty="0" err="1"/>
-              <a:t>dt</a:t>
-            </a:r>
-            <a:r>
-              <a:rPr lang="en-US" dirty="0"/>
-              <a:t>, speed, </a:t>
-            </a:r>
-            <a:r>
-              <a:rPr lang="en-US" dirty="0" err="1"/>
-              <a:t>ballsize</a:t>
-            </a:r>
-            <a:r>
-              <a:rPr lang="en-US" dirty="0"/>
-              <a:t>  )</a:t>
-            </a:r>
-          </a:p>
-          <a:p>
-            <a:endParaRPr lang="en-US" dirty="0">
-              <a:hlinkClick r:id="rId6" action="ppaction://hlinksldjump"/>
-            </a:endParaRPr>
-          </a:p>
-          <a:p>
-            <a:r>
-              <a:rPr lang="en-US" dirty="0" err="1">
-                <a:hlinkClick r:id="rId6" action="ppaction://hlinksldjump"/>
-              </a:rPr>
-              <a:t>fwdMagneticField</a:t>
-            </a:r>
-            <a:r>
-              <a:rPr lang="en-US" dirty="0"/>
-              <a:t> (  </a:t>
-            </a:r>
-            <a:r>
-              <a:rPr lang="es-ES" dirty="0" err="1"/>
-              <a:t>currx</a:t>
-            </a:r>
-            <a:r>
-              <a:rPr lang="es-ES" dirty="0"/>
-              <a:t>, curry, </a:t>
-            </a:r>
-            <a:r>
-              <a:rPr lang="es-ES" dirty="0" err="1"/>
-              <a:t>currz</a:t>
-            </a:r>
-            <a:r>
-              <a:rPr lang="es-ES" dirty="0"/>
-              <a:t>, x, y  </a:t>
-            </a:r>
-            <a:r>
-              <a:rPr lang="en-US" dirty="0"/>
-              <a:t>)</a:t>
-            </a:r>
-          </a:p>
-          <a:p>
-            <a:endParaRPr lang="en-US" dirty="0">
-              <a:hlinkClick r:id="rId7" action="ppaction://hlinksldjump"/>
-            </a:endParaRPr>
-          </a:p>
-          <a:p>
-            <a:r>
-              <a:rPr lang="en-US" dirty="0" err="1">
-                <a:hlinkClick r:id="rId7" action="ppaction://hlinksldjump"/>
-              </a:rPr>
-              <a:t>inverseMagneticField</a:t>
-            </a:r>
-            <a:r>
-              <a:rPr lang="en-US" dirty="0"/>
-              <a:t> (  x, y, phi, psi  )</a:t>
-            </a:r>
-          </a:p>
-          <a:p>
-            <a:endParaRPr lang="en-US" dirty="0"/>
           </a:p>
         </p:txBody>
       </p:sp>
@@ -16425,7 +15389,7 @@
           <a:p>
             <a:r>
               <a:rPr lang="en-US" dirty="0"/>
-              <a:t>Return current for orientation snapshots at “T/4 : </a:t>
+              <a:t>Return North pole vectors for orientation snapshots at “T/4 : </a:t>
             </a:r>
             <a:r>
               <a:rPr lang="en-US" dirty="0" err="1"/>
@@ -16448,20 +15412,8 @@
           </a:p>
           <a:p>
             <a:r>
-              <a:rPr lang="en-US" dirty="0" err="1"/>
-              <a:t>currx</a:t>
-            </a:r>
-            <a:r>
               <a:rPr lang="en-US" dirty="0"/>
-              <a:t>, curry , </a:t>
-            </a:r>
-            <a:r>
-              <a:rPr lang="en-US" dirty="0" err="1"/>
-              <a:t>currz</a:t>
-            </a:r>
-            <a:r>
-              <a:rPr lang="en-US" dirty="0"/>
-              <a:t> vectors for solenoid-current input</a:t>
+              <a:t>An array of North pole vectors from the orientation snapshots of the ball’s rotation</a:t>
             </a:r>
           </a:p>
           <a:p>

</xml_diff>